<commit_message>
Slide update with repo
</commit_message>
<xml_diff>
--- a/SNN_SIM_BIO.pptx
+++ b/SNN_SIM_BIO.pptx
@@ -848,7 +848,7 @@
   <p:cSld>
     <p:spTree>
       <p:nvGrpSpPr>
-        <p:cNvPr id="156" name="Shape 156"/>
+        <p:cNvPr id="158" name="Shape 158"/>
         <p:cNvGrpSpPr/>
         <p:nvPr/>
       </p:nvGrpSpPr>
@@ -862,7 +862,7 @@
       </p:grpSpPr>
       <p:sp>
         <p:nvSpPr>
-          <p:cNvPr id="157" name="Google Shape;157;g37bff4c125f_0_21:notes"/>
+          <p:cNvPr id="159" name="Google Shape;159;g37bff4c125f_0_21:notes"/>
           <p:cNvSpPr/>
           <p:nvPr>
             <p:ph idx="2" type="sldImg"/>
@@ -897,7 +897,7 @@
       </p:sp>
       <p:sp>
         <p:nvSpPr>
-          <p:cNvPr id="158" name="Google Shape;158;g37bff4c125f_0_21:notes"/>
+          <p:cNvPr id="160" name="Google Shape;160;g37bff4c125f_0_21:notes"/>
           <p:cNvSpPr txBox="1"/>
           <p:nvPr>
             <p:ph idx="1" type="body"/>
@@ -947,7 +947,7 @@
   <p:cSld>
     <p:spTree>
       <p:nvGrpSpPr>
-        <p:cNvPr id="164" name="Shape 164"/>
+        <p:cNvPr id="166" name="Shape 166"/>
         <p:cNvGrpSpPr/>
         <p:nvPr/>
       </p:nvGrpSpPr>
@@ -961,7 +961,7 @@
       </p:grpSpPr>
       <p:sp>
         <p:nvSpPr>
-          <p:cNvPr id="165" name="Google Shape;165;g37bff4c125f_0_28:notes"/>
+          <p:cNvPr id="167" name="Google Shape;167;g37bff4c125f_0_28:notes"/>
           <p:cNvSpPr/>
           <p:nvPr>
             <p:ph idx="2" type="sldImg"/>
@@ -996,7 +996,7 @@
       </p:sp>
       <p:sp>
         <p:nvSpPr>
-          <p:cNvPr id="166" name="Google Shape;166;g37bff4c125f_0_28:notes"/>
+          <p:cNvPr id="168" name="Google Shape;168;g37bff4c125f_0_28:notes"/>
           <p:cNvSpPr txBox="1"/>
           <p:nvPr>
             <p:ph idx="1" type="body"/>
@@ -1046,7 +1046,7 @@
   <p:cSld>
     <p:spTree>
       <p:nvGrpSpPr>
-        <p:cNvPr id="172" name="Shape 172"/>
+        <p:cNvPr id="174" name="Shape 174"/>
         <p:cNvGrpSpPr/>
         <p:nvPr/>
       </p:nvGrpSpPr>
@@ -1060,7 +1060,7 @@
       </p:grpSpPr>
       <p:sp>
         <p:nvSpPr>
-          <p:cNvPr id="173" name="Google Shape;173;g37bff4c125f_0_38:notes"/>
+          <p:cNvPr id="175" name="Google Shape;175;g37bff4c125f_0_38:notes"/>
           <p:cNvSpPr/>
           <p:nvPr>
             <p:ph idx="2" type="sldImg"/>
@@ -1095,7 +1095,7 @@
       </p:sp>
       <p:sp>
         <p:nvSpPr>
-          <p:cNvPr id="174" name="Google Shape;174;g37bff4c125f_0_38:notes"/>
+          <p:cNvPr id="176" name="Google Shape;176;g37bff4c125f_0_38:notes"/>
           <p:cNvSpPr txBox="1"/>
           <p:nvPr>
             <p:ph idx="1" type="body"/>
@@ -1145,7 +1145,7 @@
   <p:cSld>
     <p:spTree>
       <p:nvGrpSpPr>
-        <p:cNvPr id="180" name="Shape 180"/>
+        <p:cNvPr id="182" name="Shape 182"/>
         <p:cNvGrpSpPr/>
         <p:nvPr/>
       </p:nvGrpSpPr>
@@ -1159,7 +1159,7 @@
       </p:grpSpPr>
       <p:sp>
         <p:nvSpPr>
-          <p:cNvPr id="181" name="Google Shape;181;g37bff4c125f_0_61:notes"/>
+          <p:cNvPr id="183" name="Google Shape;183;g37bff4c125f_0_61:notes"/>
           <p:cNvSpPr/>
           <p:nvPr>
             <p:ph idx="2" type="sldImg"/>
@@ -1194,7 +1194,7 @@
       </p:sp>
       <p:sp>
         <p:nvSpPr>
-          <p:cNvPr id="182" name="Google Shape;182;g37bff4c125f_0_61:notes"/>
+          <p:cNvPr id="184" name="Google Shape;184;g37bff4c125f_0_61:notes"/>
           <p:cNvSpPr txBox="1"/>
           <p:nvPr>
             <p:ph idx="1" type="body"/>
@@ -1244,7 +1244,7 @@
   <p:cSld>
     <p:spTree>
       <p:nvGrpSpPr>
-        <p:cNvPr id="188" name="Shape 188"/>
+        <p:cNvPr id="190" name="Shape 190"/>
         <p:cNvGrpSpPr/>
         <p:nvPr/>
       </p:nvGrpSpPr>
@@ -1258,7 +1258,7 @@
       </p:grpSpPr>
       <p:sp>
         <p:nvSpPr>
-          <p:cNvPr id="189" name="Google Shape;189;g37bb131b18a_0_34:notes"/>
+          <p:cNvPr id="191" name="Google Shape;191;g37bb131b18a_0_34:notes"/>
           <p:cNvSpPr/>
           <p:nvPr>
             <p:ph idx="2" type="sldImg"/>
@@ -1293,7 +1293,7 @@
       </p:sp>
       <p:sp>
         <p:nvSpPr>
-          <p:cNvPr id="190" name="Google Shape;190;g37bb131b18a_0_34:notes"/>
+          <p:cNvPr id="192" name="Google Shape;192;g37bb131b18a_0_34:notes"/>
           <p:cNvSpPr txBox="1"/>
           <p:nvPr>
             <p:ph idx="1" type="body"/>
@@ -1343,7 +1343,7 @@
   <p:cSld>
     <p:spTree>
       <p:nvGrpSpPr>
-        <p:cNvPr id="194" name="Shape 194"/>
+        <p:cNvPr id="196" name="Shape 196"/>
         <p:cNvGrpSpPr/>
         <p:nvPr/>
       </p:nvGrpSpPr>
@@ -1357,7 +1357,7 @@
       </p:grpSpPr>
       <p:sp>
         <p:nvSpPr>
-          <p:cNvPr id="195" name="Google Shape;195;g37bb131b18a_0_16:notes"/>
+          <p:cNvPr id="197" name="Google Shape;197;g37bb131b18a_0_16:notes"/>
           <p:cNvSpPr/>
           <p:nvPr>
             <p:ph idx="2" type="sldImg"/>
@@ -1392,7 +1392,7 @@
       </p:sp>
       <p:sp>
         <p:nvSpPr>
-          <p:cNvPr id="196" name="Google Shape;196;g37bb131b18a_0_16:notes"/>
+          <p:cNvPr id="198" name="Google Shape;198;g37bb131b18a_0_16:notes"/>
           <p:cNvSpPr txBox="1"/>
           <p:nvPr>
             <p:ph idx="1" type="body"/>
@@ -1442,7 +1442,7 @@
   <p:cSld>
     <p:spTree>
       <p:nvGrpSpPr>
-        <p:cNvPr id="202" name="Shape 202"/>
+        <p:cNvPr id="204" name="Shape 204"/>
         <p:cNvGrpSpPr/>
         <p:nvPr/>
       </p:nvGrpSpPr>
@@ -1456,7 +1456,7 @@
       </p:grpSpPr>
       <p:sp>
         <p:nvSpPr>
-          <p:cNvPr id="203" name="Google Shape;203;g37bff4c125f_0_82:notes"/>
+          <p:cNvPr id="205" name="Google Shape;205;g37bff4c125f_0_82:notes"/>
           <p:cNvSpPr/>
           <p:nvPr>
             <p:ph idx="2" type="sldImg"/>
@@ -1491,7 +1491,7 @@
       </p:sp>
       <p:sp>
         <p:nvSpPr>
-          <p:cNvPr id="204" name="Google Shape;204;g37bff4c125f_0_82:notes"/>
+          <p:cNvPr id="206" name="Google Shape;206;g37bff4c125f_0_82:notes"/>
           <p:cNvSpPr txBox="1"/>
           <p:nvPr>
             <p:ph idx="1" type="body"/>
@@ -1541,7 +1541,7 @@
   <p:cSld>
     <p:spTree>
       <p:nvGrpSpPr>
-        <p:cNvPr id="211" name="Shape 211"/>
+        <p:cNvPr id="213" name="Shape 213"/>
         <p:cNvGrpSpPr/>
         <p:nvPr/>
       </p:nvGrpSpPr>
@@ -1555,7 +1555,7 @@
       </p:grpSpPr>
       <p:sp>
         <p:nvSpPr>
-          <p:cNvPr id="212" name="Google Shape;212;g37c42f3af57_0_0:notes"/>
+          <p:cNvPr id="214" name="Google Shape;214;g37c42f3af57_0_0:notes"/>
           <p:cNvSpPr/>
           <p:nvPr>
             <p:ph idx="2" type="sldImg"/>
@@ -1590,7 +1590,7 @@
       </p:sp>
       <p:sp>
         <p:nvSpPr>
-          <p:cNvPr id="213" name="Google Shape;213;g37c42f3af57_0_0:notes"/>
+          <p:cNvPr id="215" name="Google Shape;215;g37c42f3af57_0_0:notes"/>
           <p:cNvSpPr txBox="1"/>
           <p:nvPr>
             <p:ph idx="1" type="body"/>
@@ -1640,7 +1640,7 @@
   <p:cSld>
     <p:spTree>
       <p:nvGrpSpPr>
-        <p:cNvPr id="220" name="Shape 220"/>
+        <p:cNvPr id="222" name="Shape 222"/>
         <p:cNvGrpSpPr/>
         <p:nvPr/>
       </p:nvGrpSpPr>
@@ -1654,7 +1654,7 @@
       </p:grpSpPr>
       <p:sp>
         <p:nvSpPr>
-          <p:cNvPr id="221" name="Google Shape;221;g37bb131b18a_0_39:notes"/>
+          <p:cNvPr id="223" name="Google Shape;223;g37bb131b18a_0_39:notes"/>
           <p:cNvSpPr/>
           <p:nvPr>
             <p:ph idx="2" type="sldImg"/>
@@ -1689,7 +1689,7 @@
       </p:sp>
       <p:sp>
         <p:nvSpPr>
-          <p:cNvPr id="222" name="Google Shape;222;g37bb131b18a_0_39:notes"/>
+          <p:cNvPr id="224" name="Google Shape;224;g37bb131b18a_0_39:notes"/>
           <p:cNvSpPr txBox="1"/>
           <p:nvPr>
             <p:ph idx="1" type="body"/>
@@ -1739,7 +1739,7 @@
   <p:cSld>
     <p:spTree>
       <p:nvGrpSpPr>
-        <p:cNvPr id="226" name="Shape 226"/>
+        <p:cNvPr id="228" name="Shape 228"/>
         <p:cNvGrpSpPr/>
         <p:nvPr/>
       </p:nvGrpSpPr>
@@ -1753,7 +1753,7 @@
       </p:grpSpPr>
       <p:sp>
         <p:nvSpPr>
-          <p:cNvPr id="227" name="Google Shape;227;g37bff4c125f_0_70:notes"/>
+          <p:cNvPr id="229" name="Google Shape;229;g37bff4c125f_0_70:notes"/>
           <p:cNvSpPr/>
           <p:nvPr>
             <p:ph idx="2" type="sldImg"/>
@@ -1788,7 +1788,7 @@
       </p:sp>
       <p:sp>
         <p:nvSpPr>
-          <p:cNvPr id="228" name="Google Shape;228;g37bff4c125f_0_70:notes"/>
+          <p:cNvPr id="230" name="Google Shape;230;g37bff4c125f_0_70:notes"/>
           <p:cNvSpPr txBox="1"/>
           <p:nvPr>
             <p:ph idx="1" type="body"/>
@@ -1852,7 +1852,7 @@
       </p:grpSpPr>
       <p:sp>
         <p:nvSpPr>
-          <p:cNvPr id="89" name="Google Shape;89;g37abcb78469_0_276:notes"/>
+          <p:cNvPr id="89" name="Google Shape;89;g37abfe9d0ea_0_0:notes"/>
           <p:cNvSpPr/>
           <p:nvPr>
             <p:ph idx="2" type="sldImg"/>
@@ -1887,7 +1887,7 @@
       </p:sp>
       <p:sp>
         <p:nvSpPr>
-          <p:cNvPr id="90" name="Google Shape;90;g37abcb78469_0_276:notes"/>
+          <p:cNvPr id="90" name="Google Shape;90;g37abfe9d0ea_0_0:notes"/>
           <p:cNvSpPr txBox="1"/>
           <p:nvPr>
             <p:ph idx="1" type="body"/>
@@ -1937,7 +1937,7 @@
   <p:cSld>
     <p:spTree>
       <p:nvGrpSpPr>
-        <p:cNvPr id="234" name="Shape 234"/>
+        <p:cNvPr id="236" name="Shape 236"/>
         <p:cNvGrpSpPr/>
         <p:nvPr/>
       </p:nvGrpSpPr>
@@ -1951,7 +1951,7 @@
       </p:grpSpPr>
       <p:sp>
         <p:nvSpPr>
-          <p:cNvPr id="235" name="Google Shape;235;g37c42f3af57_0_9:notes"/>
+          <p:cNvPr id="237" name="Google Shape;237;g37c42f3af57_0_9:notes"/>
           <p:cNvSpPr/>
           <p:nvPr>
             <p:ph idx="2" type="sldImg"/>
@@ -1986,7 +1986,7 @@
       </p:sp>
       <p:sp>
         <p:nvSpPr>
-          <p:cNvPr id="236" name="Google Shape;236;g37c42f3af57_0_9:notes"/>
+          <p:cNvPr id="238" name="Google Shape;238;g37c42f3af57_0_9:notes"/>
           <p:cNvSpPr txBox="1"/>
           <p:nvPr>
             <p:ph idx="1" type="body"/>
@@ -2036,7 +2036,7 @@
   <p:cSld>
     <p:spTree>
       <p:nvGrpSpPr>
-        <p:cNvPr id="245" name="Shape 245"/>
+        <p:cNvPr id="247" name="Shape 247"/>
         <p:cNvGrpSpPr/>
         <p:nvPr/>
       </p:nvGrpSpPr>
@@ -2050,7 +2050,7 @@
       </p:grpSpPr>
       <p:sp>
         <p:nvSpPr>
-          <p:cNvPr id="246" name="Google Shape;246;g37c46abd036_0_0:notes"/>
+          <p:cNvPr id="248" name="Google Shape;248;g37c46abd036_0_0:notes"/>
           <p:cNvSpPr/>
           <p:nvPr>
             <p:ph idx="2" type="sldImg"/>
@@ -2085,7 +2085,7 @@
       </p:sp>
       <p:sp>
         <p:nvSpPr>
-          <p:cNvPr id="247" name="Google Shape;247;g37c46abd036_0_0:notes"/>
+          <p:cNvPr id="249" name="Google Shape;249;g37c46abd036_0_0:notes"/>
           <p:cNvSpPr txBox="1"/>
           <p:nvPr>
             <p:ph idx="1" type="body"/>
@@ -2135,7 +2135,7 @@
   <p:cSld>
     <p:spTree>
       <p:nvGrpSpPr>
-        <p:cNvPr id="253" name="Shape 253"/>
+        <p:cNvPr id="255" name="Shape 255"/>
         <p:cNvGrpSpPr/>
         <p:nvPr/>
       </p:nvGrpSpPr>
@@ -2149,7 +2149,7 @@
       </p:grpSpPr>
       <p:sp>
         <p:nvSpPr>
-          <p:cNvPr id="254" name="Google Shape;254;g37c42f3af57_0_34:notes"/>
+          <p:cNvPr id="256" name="Google Shape;256;g37c42f3af57_0_34:notes"/>
           <p:cNvSpPr/>
           <p:nvPr>
             <p:ph idx="2" type="sldImg"/>
@@ -2184,7 +2184,7 @@
       </p:sp>
       <p:sp>
         <p:nvSpPr>
-          <p:cNvPr id="255" name="Google Shape;255;g37c42f3af57_0_34:notes"/>
+          <p:cNvPr id="257" name="Google Shape;257;g37c42f3af57_0_34:notes"/>
           <p:cNvSpPr txBox="1"/>
           <p:nvPr>
             <p:ph idx="1" type="body"/>
@@ -2234,7 +2234,7 @@
   <p:cSld>
     <p:spTree>
       <p:nvGrpSpPr>
-        <p:cNvPr id="261" name="Shape 261"/>
+        <p:cNvPr id="263" name="Shape 263"/>
         <p:cNvGrpSpPr/>
         <p:nvPr/>
       </p:nvGrpSpPr>
@@ -2248,7 +2248,7 @@
       </p:grpSpPr>
       <p:sp>
         <p:nvSpPr>
-          <p:cNvPr id="262" name="Google Shape;262;g37c46abd036_0_43:notes"/>
+          <p:cNvPr id="264" name="Google Shape;264;g37c46abd036_0_43:notes"/>
           <p:cNvSpPr/>
           <p:nvPr>
             <p:ph idx="2" type="sldImg"/>
@@ -2283,7 +2283,7 @@
       </p:sp>
       <p:sp>
         <p:nvSpPr>
-          <p:cNvPr id="263" name="Google Shape;263;g37c46abd036_0_43:notes"/>
+          <p:cNvPr id="265" name="Google Shape;265;g37c46abd036_0_43:notes"/>
           <p:cNvSpPr txBox="1"/>
           <p:nvPr>
             <p:ph idx="1" type="body"/>
@@ -2333,7 +2333,7 @@
   <p:cSld>
     <p:spTree>
       <p:nvGrpSpPr>
-        <p:cNvPr id="269" name="Shape 269"/>
+        <p:cNvPr id="271" name="Shape 271"/>
         <p:cNvGrpSpPr/>
         <p:nvPr/>
       </p:nvGrpSpPr>
@@ -2347,7 +2347,7 @@
       </p:grpSpPr>
       <p:sp>
         <p:nvSpPr>
-          <p:cNvPr id="270" name="Google Shape;270;g37bb131b18a_0_49:notes"/>
+          <p:cNvPr id="272" name="Google Shape;272;g37bb131b18a_0_49:notes"/>
           <p:cNvSpPr/>
           <p:nvPr>
             <p:ph idx="2" type="sldImg"/>
@@ -2382,7 +2382,7 @@
       </p:sp>
       <p:sp>
         <p:nvSpPr>
-          <p:cNvPr id="271" name="Google Shape;271;g37bb131b18a_0_49:notes"/>
+          <p:cNvPr id="273" name="Google Shape;273;g37bb131b18a_0_49:notes"/>
           <p:cNvSpPr txBox="1"/>
           <p:nvPr>
             <p:ph idx="1" type="body"/>
@@ -2432,7 +2432,7 @@
   <p:cSld>
     <p:spTree>
       <p:nvGrpSpPr>
-        <p:cNvPr id="275" name="Shape 275"/>
+        <p:cNvPr id="277" name="Shape 277"/>
         <p:cNvGrpSpPr/>
         <p:nvPr/>
       </p:nvGrpSpPr>
@@ -2446,7 +2446,7 @@
       </p:grpSpPr>
       <p:sp>
         <p:nvSpPr>
-          <p:cNvPr id="276" name="Google Shape;276;g37c46abd036_0_7:notes"/>
+          <p:cNvPr id="278" name="Google Shape;278;g37c46abd036_0_7:notes"/>
           <p:cNvSpPr/>
           <p:nvPr>
             <p:ph idx="2" type="sldImg"/>
@@ -2481,7 +2481,7 @@
       </p:sp>
       <p:sp>
         <p:nvSpPr>
-          <p:cNvPr id="277" name="Google Shape;277;g37c46abd036_0_7:notes"/>
+          <p:cNvPr id="279" name="Google Shape;279;g37c46abd036_0_7:notes"/>
           <p:cNvSpPr txBox="1"/>
           <p:nvPr>
             <p:ph idx="1" type="body"/>
@@ -2531,7 +2531,7 @@
   <p:cSld>
     <p:spTree>
       <p:nvGrpSpPr>
-        <p:cNvPr id="283" name="Shape 283"/>
+        <p:cNvPr id="285" name="Shape 285"/>
         <p:cNvGrpSpPr/>
         <p:nvPr/>
       </p:nvGrpSpPr>
@@ -2545,7 +2545,7 @@
       </p:grpSpPr>
       <p:sp>
         <p:nvSpPr>
-          <p:cNvPr id="284" name="Google Shape;284;g37c46abd036_0_24:notes"/>
+          <p:cNvPr id="286" name="Google Shape;286;g37c46abd036_0_24:notes"/>
           <p:cNvSpPr/>
           <p:nvPr>
             <p:ph idx="2" type="sldImg"/>
@@ -2580,7 +2580,7 @@
       </p:sp>
       <p:sp>
         <p:nvSpPr>
-          <p:cNvPr id="285" name="Google Shape;285;g37c46abd036_0_24:notes"/>
+          <p:cNvPr id="287" name="Google Shape;287;g37c46abd036_0_24:notes"/>
           <p:cNvSpPr txBox="1"/>
           <p:nvPr>
             <p:ph idx="1" type="body"/>
@@ -2630,7 +2630,7 @@
   <p:cSld>
     <p:spTree>
       <p:nvGrpSpPr>
-        <p:cNvPr id="291" name="Shape 291"/>
+        <p:cNvPr id="293" name="Shape 293"/>
         <p:cNvGrpSpPr/>
         <p:nvPr/>
       </p:nvGrpSpPr>
@@ -2644,7 +2644,7 @@
       </p:grpSpPr>
       <p:sp>
         <p:nvSpPr>
-          <p:cNvPr id="292" name="Google Shape;292;g37c46abd036_0_34:notes"/>
+          <p:cNvPr id="294" name="Google Shape;294;g37c46abd036_0_34:notes"/>
           <p:cNvSpPr/>
           <p:nvPr>
             <p:ph idx="2" type="sldImg"/>
@@ -2679,7 +2679,7 @@
       </p:sp>
       <p:sp>
         <p:nvSpPr>
-          <p:cNvPr id="293" name="Google Shape;293;g37c46abd036_0_34:notes"/>
+          <p:cNvPr id="295" name="Google Shape;295;g37c46abd036_0_34:notes"/>
           <p:cNvSpPr txBox="1"/>
           <p:nvPr>
             <p:ph idx="1" type="body"/>
@@ -2729,7 +2729,7 @@
   <p:cSld>
     <p:spTree>
       <p:nvGrpSpPr>
-        <p:cNvPr id="299" name="Shape 299"/>
+        <p:cNvPr id="301" name="Shape 301"/>
         <p:cNvGrpSpPr/>
         <p:nvPr/>
       </p:nvGrpSpPr>
@@ -2743,7 +2743,7 @@
       </p:grpSpPr>
       <p:sp>
         <p:nvSpPr>
-          <p:cNvPr id="300" name="Google Shape;300;g37c46abd036_0_15:notes"/>
+          <p:cNvPr id="302" name="Google Shape;302;g37c46abd036_0_15:notes"/>
           <p:cNvSpPr/>
           <p:nvPr>
             <p:ph idx="2" type="sldImg"/>
@@ -2778,7 +2778,7 @@
       </p:sp>
       <p:sp>
         <p:nvSpPr>
-          <p:cNvPr id="301" name="Google Shape;301;g37c46abd036_0_15:notes"/>
+          <p:cNvPr id="303" name="Google Shape;303;g37c46abd036_0_15:notes"/>
           <p:cNvSpPr txBox="1"/>
           <p:nvPr>
             <p:ph idx="1" type="body"/>
@@ -2828,7 +2828,7 @@
   <p:cSld>
     <p:spTree>
       <p:nvGrpSpPr>
-        <p:cNvPr id="307" name="Shape 307"/>
+        <p:cNvPr id="309" name="Shape 309"/>
         <p:cNvGrpSpPr/>
         <p:nvPr/>
       </p:nvGrpSpPr>
@@ -2842,7 +2842,7 @@
       </p:grpSpPr>
       <p:sp>
         <p:nvSpPr>
-          <p:cNvPr id="308" name="Google Shape;308;g37bb131b18a_0_44:notes"/>
+          <p:cNvPr id="310" name="Google Shape;310;g37bb131b18a_0_44:notes"/>
           <p:cNvSpPr/>
           <p:nvPr>
             <p:ph idx="2" type="sldImg"/>
@@ -2877,7 +2877,7 @@
       </p:sp>
       <p:sp>
         <p:nvSpPr>
-          <p:cNvPr id="309" name="Google Shape;309;g37bb131b18a_0_44:notes"/>
+          <p:cNvPr id="311" name="Google Shape;311;g37bb131b18a_0_44:notes"/>
           <p:cNvSpPr txBox="1"/>
           <p:nvPr>
             <p:ph idx="1" type="body"/>
@@ -2927,7 +2927,7 @@
   <p:cSld>
     <p:spTree>
       <p:nvGrpSpPr>
-        <p:cNvPr id="99" name="Shape 99"/>
+        <p:cNvPr id="97" name="Shape 97"/>
         <p:cNvGrpSpPr/>
         <p:nvPr/>
       </p:nvGrpSpPr>
@@ -2941,7 +2941,7 @@
       </p:grpSpPr>
       <p:sp>
         <p:nvSpPr>
-          <p:cNvPr id="100" name="Google Shape;100;g3819d2dfc70_0_0:notes"/>
+          <p:cNvPr id="98" name="Google Shape;98;g37abcb78469_0_276:notes"/>
           <p:cNvSpPr/>
           <p:nvPr>
             <p:ph idx="2" type="sldImg"/>
@@ -2976,7 +2976,7 @@
       </p:sp>
       <p:sp>
         <p:nvSpPr>
-          <p:cNvPr id="101" name="Google Shape;101;g3819d2dfc70_0_0:notes"/>
+          <p:cNvPr id="99" name="Google Shape;99;g37abcb78469_0_276:notes"/>
           <p:cNvSpPr txBox="1"/>
           <p:nvPr>
             <p:ph idx="1" type="body"/>
@@ -3026,7 +3026,7 @@
   <p:cSld>
     <p:spTree>
       <p:nvGrpSpPr>
-        <p:cNvPr id="313" name="Shape 313"/>
+        <p:cNvPr id="315" name="Shape 315"/>
         <p:cNvGrpSpPr/>
         <p:nvPr/>
       </p:nvGrpSpPr>
@@ -3040,7 +3040,7 @@
       </p:grpSpPr>
       <p:sp>
         <p:nvSpPr>
-          <p:cNvPr id="314" name="Google Shape;314;g37c5f2c84d0_1_5:notes"/>
+          <p:cNvPr id="316" name="Google Shape;316;g37c5f2c84d0_1_5:notes"/>
           <p:cNvSpPr/>
           <p:nvPr>
             <p:ph idx="2" type="sldImg"/>
@@ -3075,7 +3075,7 @@
       </p:sp>
       <p:sp>
         <p:nvSpPr>
-          <p:cNvPr id="315" name="Google Shape;315;g37c5f2c84d0_1_5:notes"/>
+          <p:cNvPr id="317" name="Google Shape;317;g37c5f2c84d0_1_5:notes"/>
           <p:cNvSpPr txBox="1"/>
           <p:nvPr>
             <p:ph idx="1" type="body"/>
@@ -3125,7 +3125,7 @@
   <p:cSld>
     <p:spTree>
       <p:nvGrpSpPr>
-        <p:cNvPr id="322" name="Shape 322"/>
+        <p:cNvPr id="324" name="Shape 324"/>
         <p:cNvGrpSpPr/>
         <p:nvPr/>
       </p:nvGrpSpPr>
@@ -3139,7 +3139,7 @@
       </p:grpSpPr>
       <p:sp>
         <p:nvSpPr>
-          <p:cNvPr id="323" name="Google Shape;323;g37c5f2c84d0_1_20:notes"/>
+          <p:cNvPr id="325" name="Google Shape;325;g37c5f2c84d0_1_20:notes"/>
           <p:cNvSpPr/>
           <p:nvPr>
             <p:ph idx="2" type="sldImg"/>
@@ -3174,7 +3174,7 @@
       </p:sp>
       <p:sp>
         <p:nvSpPr>
-          <p:cNvPr id="324" name="Google Shape;324;g37c5f2c84d0_1_20:notes"/>
+          <p:cNvPr id="326" name="Google Shape;326;g37c5f2c84d0_1_20:notes"/>
           <p:cNvSpPr txBox="1"/>
           <p:nvPr>
             <p:ph idx="1" type="body"/>
@@ -3224,7 +3224,7 @@
   <p:cSld>
     <p:spTree>
       <p:nvGrpSpPr>
-        <p:cNvPr id="331" name="Shape 331"/>
+        <p:cNvPr id="333" name="Shape 333"/>
         <p:cNvGrpSpPr/>
         <p:nvPr/>
       </p:nvGrpSpPr>
@@ -3238,7 +3238,7 @@
       </p:grpSpPr>
       <p:sp>
         <p:nvSpPr>
-          <p:cNvPr id="332" name="Google Shape;332;g37c60c5145d_0_4:notes"/>
+          <p:cNvPr id="334" name="Google Shape;334;g37c60c5145d_0_4:notes"/>
           <p:cNvSpPr/>
           <p:nvPr>
             <p:ph idx="2" type="sldImg"/>
@@ -3273,7 +3273,7 @@
       </p:sp>
       <p:sp>
         <p:nvSpPr>
-          <p:cNvPr id="333" name="Google Shape;333;g37c60c5145d_0_4:notes"/>
+          <p:cNvPr id="335" name="Google Shape;335;g37c60c5145d_0_4:notes"/>
           <p:cNvSpPr txBox="1"/>
           <p:nvPr>
             <p:ph idx="1" type="body"/>
@@ -3323,7 +3323,7 @@
   <p:cSld>
     <p:spTree>
       <p:nvGrpSpPr>
-        <p:cNvPr id="339" name="Shape 339"/>
+        <p:cNvPr id="341" name="Shape 341"/>
         <p:cNvGrpSpPr/>
         <p:nvPr/>
       </p:nvGrpSpPr>
@@ -3337,7 +3337,7 @@
       </p:grpSpPr>
       <p:sp>
         <p:nvSpPr>
-          <p:cNvPr id="340" name="Google Shape;340;g37c60c5145d_0_43:notes"/>
+          <p:cNvPr id="342" name="Google Shape;342;g37c60c5145d_0_43:notes"/>
           <p:cNvSpPr/>
           <p:nvPr>
             <p:ph idx="2" type="sldImg"/>
@@ -3372,7 +3372,7 @@
       </p:sp>
       <p:sp>
         <p:nvSpPr>
-          <p:cNvPr id="341" name="Google Shape;341;g37c60c5145d_0_43:notes"/>
+          <p:cNvPr id="343" name="Google Shape;343;g37c60c5145d_0_43:notes"/>
           <p:cNvSpPr txBox="1"/>
           <p:nvPr>
             <p:ph idx="1" type="body"/>
@@ -3422,7 +3422,7 @@
   <p:cSld>
     <p:spTree>
       <p:nvGrpSpPr>
-        <p:cNvPr id="348" name="Shape 348"/>
+        <p:cNvPr id="350" name="Shape 350"/>
         <p:cNvGrpSpPr/>
         <p:nvPr/>
       </p:nvGrpSpPr>
@@ -3436,7 +3436,7 @@
       </p:grpSpPr>
       <p:sp>
         <p:nvSpPr>
-          <p:cNvPr id="349" name="Google Shape;349;g37c60c5145d_0_11:notes"/>
+          <p:cNvPr id="351" name="Google Shape;351;g37c60c5145d_0_11:notes"/>
           <p:cNvSpPr/>
           <p:nvPr>
             <p:ph idx="2" type="sldImg"/>
@@ -3471,7 +3471,7 @@
       </p:sp>
       <p:sp>
         <p:nvSpPr>
-          <p:cNvPr id="350" name="Google Shape;350;g37c60c5145d_0_11:notes"/>
+          <p:cNvPr id="352" name="Google Shape;352;g37c60c5145d_0_11:notes"/>
           <p:cNvSpPr txBox="1"/>
           <p:nvPr>
             <p:ph idx="1" type="body"/>
@@ -3521,7 +3521,7 @@
   <p:cSld>
     <p:spTree>
       <p:nvGrpSpPr>
-        <p:cNvPr id="357" name="Shape 357"/>
+        <p:cNvPr id="359" name="Shape 359"/>
         <p:cNvGrpSpPr/>
         <p:nvPr/>
       </p:nvGrpSpPr>
@@ -3535,7 +3535,7 @@
       </p:grpSpPr>
       <p:sp>
         <p:nvSpPr>
-          <p:cNvPr id="358" name="Google Shape;358;g37c60c5145d_0_19:notes"/>
+          <p:cNvPr id="360" name="Google Shape;360;g37c60c5145d_0_19:notes"/>
           <p:cNvSpPr/>
           <p:nvPr>
             <p:ph idx="2" type="sldImg"/>
@@ -3570,7 +3570,7 @@
       </p:sp>
       <p:sp>
         <p:nvSpPr>
-          <p:cNvPr id="359" name="Google Shape;359;g37c60c5145d_0_19:notes"/>
+          <p:cNvPr id="361" name="Google Shape;361;g37c60c5145d_0_19:notes"/>
           <p:cNvSpPr txBox="1"/>
           <p:nvPr>
             <p:ph idx="1" type="body"/>
@@ -3620,7 +3620,7 @@
   <p:cSld>
     <p:spTree>
       <p:nvGrpSpPr>
-        <p:cNvPr id="366" name="Shape 366"/>
+        <p:cNvPr id="368" name="Shape 368"/>
         <p:cNvGrpSpPr/>
         <p:nvPr/>
       </p:nvGrpSpPr>
@@ -3634,7 +3634,7 @@
       </p:grpSpPr>
       <p:sp>
         <p:nvSpPr>
-          <p:cNvPr id="367" name="Google Shape;367;g37c60c5145d_0_30:notes"/>
+          <p:cNvPr id="369" name="Google Shape;369;g37c60c5145d_0_30:notes"/>
           <p:cNvSpPr/>
           <p:nvPr>
             <p:ph idx="2" type="sldImg"/>
@@ -3669,7 +3669,7 @@
       </p:sp>
       <p:sp>
         <p:nvSpPr>
-          <p:cNvPr id="368" name="Google Shape;368;g37c60c5145d_0_30:notes"/>
+          <p:cNvPr id="370" name="Google Shape;370;g37c60c5145d_0_30:notes"/>
           <p:cNvSpPr txBox="1"/>
           <p:nvPr>
             <p:ph idx="1" type="body"/>
@@ -3719,7 +3719,7 @@
   <p:cSld>
     <p:spTree>
       <p:nvGrpSpPr>
-        <p:cNvPr id="377" name="Shape 377"/>
+        <p:cNvPr id="379" name="Shape 379"/>
         <p:cNvGrpSpPr/>
         <p:nvPr/>
       </p:nvGrpSpPr>
@@ -3733,7 +3733,7 @@
       </p:grpSpPr>
       <p:sp>
         <p:nvSpPr>
-          <p:cNvPr id="378" name="Google Shape;378;g37bb131b18a_0_55:notes"/>
+          <p:cNvPr id="380" name="Google Shape;380;g37bb131b18a_0_55:notes"/>
           <p:cNvSpPr/>
           <p:nvPr>
             <p:ph idx="2" type="sldImg"/>
@@ -3768,7 +3768,7 @@
       </p:sp>
       <p:sp>
         <p:nvSpPr>
-          <p:cNvPr id="379" name="Google Shape;379;g37bb131b18a_0_55:notes"/>
+          <p:cNvPr id="381" name="Google Shape;381;g37bb131b18a_0_55:notes"/>
           <p:cNvSpPr txBox="1"/>
           <p:nvPr>
             <p:ph idx="1" type="body"/>
@@ -3818,7 +3818,7 @@
   <p:cSld>
     <p:spTree>
       <p:nvGrpSpPr>
-        <p:cNvPr id="383" name="Shape 383"/>
+        <p:cNvPr id="385" name="Shape 385"/>
         <p:cNvGrpSpPr/>
         <p:nvPr/>
       </p:nvGrpSpPr>
@@ -3832,7 +3832,7 @@
       </p:grpSpPr>
       <p:sp>
         <p:nvSpPr>
-          <p:cNvPr id="384" name="Google Shape;384;g37c6af380a0_0_0:notes"/>
+          <p:cNvPr id="386" name="Google Shape;386;g37c6af380a0_0_0:notes"/>
           <p:cNvSpPr/>
           <p:nvPr>
             <p:ph idx="2" type="sldImg"/>
@@ -3867,7 +3867,7 @@
       </p:sp>
       <p:sp>
         <p:nvSpPr>
-          <p:cNvPr id="385" name="Google Shape;385;g37c6af380a0_0_0:notes"/>
+          <p:cNvPr id="387" name="Google Shape;387;g37c6af380a0_0_0:notes"/>
           <p:cNvSpPr txBox="1"/>
           <p:nvPr>
             <p:ph idx="1" type="body"/>
@@ -3917,7 +3917,7 @@
   <p:cSld>
     <p:spTree>
       <p:nvGrpSpPr>
-        <p:cNvPr id="392" name="Shape 392"/>
+        <p:cNvPr id="394" name="Shape 394"/>
         <p:cNvGrpSpPr/>
         <p:nvPr/>
       </p:nvGrpSpPr>
@@ -3931,7 +3931,7 @@
       </p:grpSpPr>
       <p:sp>
         <p:nvSpPr>
-          <p:cNvPr id="393" name="Google Shape;393;g3887cf2a151_0_18:notes"/>
+          <p:cNvPr id="395" name="Google Shape;395;g3887cf2a151_0_18:notes"/>
           <p:cNvSpPr/>
           <p:nvPr>
             <p:ph idx="2" type="sldImg"/>
@@ -3966,7 +3966,7 @@
       </p:sp>
       <p:sp>
         <p:nvSpPr>
-          <p:cNvPr id="394" name="Google Shape;394;g3887cf2a151_0_18:notes"/>
+          <p:cNvPr id="396" name="Google Shape;396;g3887cf2a151_0_18:notes"/>
           <p:cNvSpPr txBox="1"/>
           <p:nvPr>
             <p:ph idx="1" type="body"/>
@@ -4016,7 +4016,7 @@
   <p:cSld>
     <p:spTree>
       <p:nvGrpSpPr>
-        <p:cNvPr id="106" name="Shape 106"/>
+        <p:cNvPr id="108" name="Shape 108"/>
         <p:cNvGrpSpPr/>
         <p:nvPr/>
       </p:nvGrpSpPr>
@@ -4030,7 +4030,7 @@
       </p:grpSpPr>
       <p:sp>
         <p:nvSpPr>
-          <p:cNvPr id="107" name="Google Shape;107;g37abfe9d0ea_0_0:notes"/>
+          <p:cNvPr id="109" name="Google Shape;109;g3819d2dfc70_0_0:notes"/>
           <p:cNvSpPr/>
           <p:nvPr>
             <p:ph idx="2" type="sldImg"/>
@@ -4065,7 +4065,7 @@
       </p:sp>
       <p:sp>
         <p:nvSpPr>
-          <p:cNvPr id="108" name="Google Shape;108;g37abfe9d0ea_0_0:notes"/>
+          <p:cNvPr id="110" name="Google Shape;110;g3819d2dfc70_0_0:notes"/>
           <p:cNvSpPr txBox="1"/>
           <p:nvPr>
             <p:ph idx="1" type="body"/>
@@ -4115,7 +4115,7 @@
   <p:cSld>
     <p:spTree>
       <p:nvGrpSpPr>
-        <p:cNvPr id="400" name="Shape 400"/>
+        <p:cNvPr id="402" name="Shape 402"/>
         <p:cNvGrpSpPr/>
         <p:nvPr/>
       </p:nvGrpSpPr>
@@ -4129,7 +4129,7 @@
       </p:grpSpPr>
       <p:sp>
         <p:nvSpPr>
-          <p:cNvPr id="401" name="Google Shape;401;g3887cf2a151_0_0:notes"/>
+          <p:cNvPr id="403" name="Google Shape;403;g3887cf2a151_0_0:notes"/>
           <p:cNvSpPr/>
           <p:nvPr>
             <p:ph idx="2" type="sldImg"/>
@@ -4164,7 +4164,7 @@
       </p:sp>
       <p:sp>
         <p:nvSpPr>
-          <p:cNvPr id="402" name="Google Shape;402;g3887cf2a151_0_0:notes"/>
+          <p:cNvPr id="404" name="Google Shape;404;g3887cf2a151_0_0:notes"/>
           <p:cNvSpPr txBox="1"/>
           <p:nvPr>
             <p:ph idx="1" type="body"/>
@@ -4214,7 +4214,7 @@
   <p:cSld>
     <p:spTree>
       <p:nvGrpSpPr>
-        <p:cNvPr id="411" name="Shape 411"/>
+        <p:cNvPr id="413" name="Shape 413"/>
         <p:cNvGrpSpPr/>
         <p:nvPr/>
       </p:nvGrpSpPr>
@@ -4228,7 +4228,7 @@
       </p:grpSpPr>
       <p:sp>
         <p:nvSpPr>
-          <p:cNvPr id="412" name="Google Shape;412;g3887cf2a151_0_30:notes"/>
+          <p:cNvPr id="414" name="Google Shape;414;g3887cf2a151_0_30:notes"/>
           <p:cNvSpPr/>
           <p:nvPr>
             <p:ph idx="2" type="sldImg"/>
@@ -4263,7 +4263,7 @@
       </p:sp>
       <p:sp>
         <p:nvSpPr>
-          <p:cNvPr id="413" name="Google Shape;413;g3887cf2a151_0_30:notes"/>
+          <p:cNvPr id="415" name="Google Shape;415;g3887cf2a151_0_30:notes"/>
           <p:cNvSpPr txBox="1"/>
           <p:nvPr>
             <p:ph idx="1" type="body"/>
@@ -4313,7 +4313,7 @@
   <p:cSld>
     <p:spTree>
       <p:nvGrpSpPr>
-        <p:cNvPr id="423" name="Shape 423"/>
+        <p:cNvPr id="425" name="Shape 425"/>
         <p:cNvGrpSpPr/>
         <p:nvPr/>
       </p:nvGrpSpPr>
@@ -4327,7 +4327,7 @@
       </p:grpSpPr>
       <p:sp>
         <p:nvSpPr>
-          <p:cNvPr id="424" name="Google Shape;424;g3887cf2a151_0_46:notes"/>
+          <p:cNvPr id="426" name="Google Shape;426;g3887cf2a151_0_46:notes"/>
           <p:cNvSpPr/>
           <p:nvPr>
             <p:ph idx="2" type="sldImg"/>
@@ -4362,7 +4362,7 @@
       </p:sp>
       <p:sp>
         <p:nvSpPr>
-          <p:cNvPr id="425" name="Google Shape;425;g3887cf2a151_0_46:notes"/>
+          <p:cNvPr id="427" name="Google Shape;427;g3887cf2a151_0_46:notes"/>
           <p:cNvSpPr txBox="1"/>
           <p:nvPr>
             <p:ph idx="1" type="body"/>
@@ -4412,7 +4412,7 @@
   <p:cSld>
     <p:spTree>
       <p:nvGrpSpPr>
-        <p:cNvPr id="435" name="Shape 435"/>
+        <p:cNvPr id="437" name="Shape 437"/>
         <p:cNvGrpSpPr/>
         <p:nvPr/>
       </p:nvGrpSpPr>
@@ -4426,7 +4426,7 @@
       </p:grpSpPr>
       <p:sp>
         <p:nvSpPr>
-          <p:cNvPr id="436" name="Google Shape;436;g3887cf2a151_0_10:notes"/>
+          <p:cNvPr id="438" name="Google Shape;438;g3887cf2a151_0_10:notes"/>
           <p:cNvSpPr/>
           <p:nvPr>
             <p:ph idx="2" type="sldImg"/>
@@ -4461,7 +4461,7 @@
       </p:sp>
       <p:sp>
         <p:nvSpPr>
-          <p:cNvPr id="437" name="Google Shape;437;g3887cf2a151_0_10:notes"/>
+          <p:cNvPr id="439" name="Google Shape;439;g3887cf2a151_0_10:notes"/>
           <p:cNvSpPr txBox="1"/>
           <p:nvPr>
             <p:ph idx="1" type="body"/>
@@ -4511,7 +4511,7 @@
   <p:cSld>
     <p:spTree>
       <p:nvGrpSpPr>
-        <p:cNvPr id="113" name="Shape 113"/>
+        <p:cNvPr id="115" name="Shape 115"/>
         <p:cNvGrpSpPr/>
         <p:nvPr/>
       </p:nvGrpSpPr>
@@ -4525,7 +4525,7 @@
       </p:grpSpPr>
       <p:sp>
         <p:nvSpPr>
-          <p:cNvPr id="114" name="Google Shape;114;g37bb131b18a_0_0:notes"/>
+          <p:cNvPr id="116" name="Google Shape;116;g37bb131b18a_0_0:notes"/>
           <p:cNvSpPr/>
           <p:nvPr>
             <p:ph idx="2" type="sldImg"/>
@@ -4560,7 +4560,7 @@
       </p:sp>
       <p:sp>
         <p:nvSpPr>
-          <p:cNvPr id="115" name="Google Shape;115;g37bb131b18a_0_0:notes"/>
+          <p:cNvPr id="117" name="Google Shape;117;g37bb131b18a_0_0:notes"/>
           <p:cNvSpPr txBox="1"/>
           <p:nvPr>
             <p:ph idx="1" type="body"/>
@@ -4610,7 +4610,7 @@
   <p:cSld>
     <p:spTree>
       <p:nvGrpSpPr>
-        <p:cNvPr id="123" name="Shape 123"/>
+        <p:cNvPr id="125" name="Shape 125"/>
         <p:cNvGrpSpPr/>
         <p:nvPr/>
       </p:nvGrpSpPr>
@@ -4624,7 +4624,7 @@
       </p:grpSpPr>
       <p:sp>
         <p:nvSpPr>
-          <p:cNvPr id="124" name="Google Shape;124;g37bb131b18a_0_28:notes"/>
+          <p:cNvPr id="126" name="Google Shape;126;g37bb131b18a_0_28:notes"/>
           <p:cNvSpPr/>
           <p:nvPr>
             <p:ph idx="2" type="sldImg"/>
@@ -4659,7 +4659,7 @@
       </p:sp>
       <p:sp>
         <p:nvSpPr>
-          <p:cNvPr id="125" name="Google Shape;125;g37bb131b18a_0_28:notes"/>
+          <p:cNvPr id="127" name="Google Shape;127;g37bb131b18a_0_28:notes"/>
           <p:cNvSpPr txBox="1"/>
           <p:nvPr>
             <p:ph idx="1" type="body"/>
@@ -4709,7 +4709,7 @@
   <p:cSld>
     <p:spTree>
       <p:nvGrpSpPr>
-        <p:cNvPr id="129" name="Shape 129"/>
+        <p:cNvPr id="131" name="Shape 131"/>
         <p:cNvGrpSpPr/>
         <p:nvPr/>
       </p:nvGrpSpPr>
@@ -4723,7 +4723,7 @@
       </p:grpSpPr>
       <p:sp>
         <p:nvSpPr>
-          <p:cNvPr id="130" name="Google Shape;130;g37bb131b18a_0_22:notes"/>
+          <p:cNvPr id="132" name="Google Shape;132;g37bb131b18a_0_22:notes"/>
           <p:cNvSpPr/>
           <p:nvPr>
             <p:ph idx="2" type="sldImg"/>
@@ -4758,7 +4758,7 @@
       </p:sp>
       <p:sp>
         <p:nvSpPr>
-          <p:cNvPr id="131" name="Google Shape;131;g37bb131b18a_0_22:notes"/>
+          <p:cNvPr id="133" name="Google Shape;133;g37bb131b18a_0_22:notes"/>
           <p:cNvSpPr txBox="1"/>
           <p:nvPr>
             <p:ph idx="1" type="body"/>
@@ -4808,7 +4808,7 @@
   <p:cSld>
     <p:spTree>
       <p:nvGrpSpPr>
-        <p:cNvPr id="136" name="Shape 136"/>
+        <p:cNvPr id="138" name="Shape 138"/>
         <p:cNvGrpSpPr/>
         <p:nvPr/>
       </p:nvGrpSpPr>
@@ -4822,7 +4822,7 @@
       </p:grpSpPr>
       <p:sp>
         <p:nvSpPr>
-          <p:cNvPr id="137" name="Google Shape;137;g37bff4c125f_0_0:notes"/>
+          <p:cNvPr id="139" name="Google Shape;139;g37bff4c125f_0_0:notes"/>
           <p:cNvSpPr/>
           <p:nvPr>
             <p:ph idx="2" type="sldImg"/>
@@ -4857,7 +4857,7 @@
       </p:sp>
       <p:sp>
         <p:nvSpPr>
-          <p:cNvPr id="138" name="Google Shape;138;g37bff4c125f_0_0:notes"/>
+          <p:cNvPr id="140" name="Google Shape;140;g37bff4c125f_0_0:notes"/>
           <p:cNvSpPr txBox="1"/>
           <p:nvPr>
             <p:ph idx="1" type="body"/>
@@ -4907,7 +4907,7 @@
   <p:cSld>
     <p:spTree>
       <p:nvGrpSpPr>
-        <p:cNvPr id="144" name="Shape 144"/>
+        <p:cNvPr id="146" name="Shape 146"/>
         <p:cNvGrpSpPr/>
         <p:nvPr/>
       </p:nvGrpSpPr>
@@ -4921,7 +4921,7 @@
       </p:grpSpPr>
       <p:sp>
         <p:nvSpPr>
-          <p:cNvPr id="145" name="Google Shape;145;g37bff4c125f_0_8:notes"/>
+          <p:cNvPr id="147" name="Google Shape;147;g37bff4c125f_0_8:notes"/>
           <p:cNvSpPr/>
           <p:nvPr>
             <p:ph idx="2" type="sldImg"/>
@@ -4956,7 +4956,7 @@
       </p:sp>
       <p:sp>
         <p:nvSpPr>
-          <p:cNvPr id="146" name="Google Shape;146;g37bff4c125f_0_8:notes"/>
+          <p:cNvPr id="148" name="Google Shape;148;g37bff4c125f_0_8:notes"/>
           <p:cNvSpPr txBox="1"/>
           <p:nvPr>
             <p:ph idx="1" type="body"/>
@@ -11398,7 +11398,7 @@
   <p:cSld>
     <p:spTree>
       <p:nvGrpSpPr>
-        <p:cNvPr id="159" name="Shape 159"/>
+        <p:cNvPr id="161" name="Shape 161"/>
         <p:cNvGrpSpPr/>
         <p:nvPr/>
       </p:nvGrpSpPr>
@@ -11412,7 +11412,7 @@
       </p:grpSpPr>
       <p:sp>
         <p:nvSpPr>
-          <p:cNvPr id="160" name="Google Shape;160;p22"/>
+          <p:cNvPr id="162" name="Google Shape;162;p22"/>
           <p:cNvSpPr txBox="1"/>
           <p:nvPr>
             <p:ph idx="1" type="body"/>
@@ -11477,7 +11477,7 @@
       </p:sp>
       <p:sp>
         <p:nvSpPr>
-          <p:cNvPr id="161" name="Google Shape;161;p22"/>
+          <p:cNvPr id="163" name="Google Shape;163;p22"/>
           <p:cNvSpPr txBox="1"/>
           <p:nvPr>
             <p:ph type="title"/>
@@ -11517,7 +11517,7 @@
       </p:sp>
       <p:sp>
         <p:nvSpPr>
-          <p:cNvPr id="162" name="Google Shape;162;p22"/>
+          <p:cNvPr id="164" name="Google Shape;164;p22"/>
           <p:cNvSpPr txBox="1"/>
           <p:nvPr>
             <p:ph idx="12" type="sldNum"/>
@@ -11557,7 +11557,7 @@
       </p:sp>
       <p:pic>
         <p:nvPicPr>
-          <p:cNvPr id="163" name="Google Shape;163;p22"/>
+          <p:cNvPr id="165" name="Google Shape;165;p22"/>
           <p:cNvPicPr preferRelativeResize="0"/>
           <p:nvPr/>
         </p:nvPicPr>
@@ -11595,7 +11595,7 @@
   <p:cSld>
     <p:spTree>
       <p:nvGrpSpPr>
-        <p:cNvPr id="167" name="Shape 167"/>
+        <p:cNvPr id="169" name="Shape 169"/>
         <p:cNvGrpSpPr/>
         <p:nvPr/>
       </p:nvGrpSpPr>
@@ -11609,7 +11609,7 @@
       </p:grpSpPr>
       <p:sp>
         <p:nvSpPr>
-          <p:cNvPr id="168" name="Google Shape;168;p23"/>
+          <p:cNvPr id="170" name="Google Shape;170;p23"/>
           <p:cNvSpPr txBox="1"/>
           <p:nvPr>
             <p:ph type="title"/>
@@ -11649,7 +11649,7 @@
       </p:sp>
       <p:sp>
         <p:nvSpPr>
-          <p:cNvPr id="169" name="Google Shape;169;p23"/>
+          <p:cNvPr id="171" name="Google Shape;171;p23"/>
           <p:cNvSpPr txBox="1"/>
           <p:nvPr>
             <p:ph idx="1" type="body"/>
@@ -11736,7 +11736,7 @@
       </p:sp>
       <p:sp>
         <p:nvSpPr>
-          <p:cNvPr id="170" name="Google Shape;170;p23"/>
+          <p:cNvPr id="172" name="Google Shape;172;p23"/>
           <p:cNvSpPr txBox="1"/>
           <p:nvPr>
             <p:ph idx="12" type="sldNum"/>
@@ -11776,7 +11776,7 @@
       </p:sp>
       <p:pic>
         <p:nvPicPr>
-          <p:cNvPr id="171" name="Google Shape;171;p23"/>
+          <p:cNvPr id="173" name="Google Shape;173;p23"/>
           <p:cNvPicPr preferRelativeResize="0"/>
           <p:nvPr/>
         </p:nvPicPr>
@@ -11815,7 +11815,7 @@
   <p:cSld>
     <p:spTree>
       <p:nvGrpSpPr>
-        <p:cNvPr id="175" name="Shape 175"/>
+        <p:cNvPr id="177" name="Shape 177"/>
         <p:cNvGrpSpPr/>
         <p:nvPr/>
       </p:nvGrpSpPr>
@@ -11829,7 +11829,7 @@
       </p:grpSpPr>
       <p:sp>
         <p:nvSpPr>
-          <p:cNvPr id="176" name="Google Shape;176;p24"/>
+          <p:cNvPr id="178" name="Google Shape;178;p24"/>
           <p:cNvSpPr txBox="1"/>
           <p:nvPr>
             <p:ph type="title"/>
@@ -11869,7 +11869,7 @@
       </p:sp>
       <p:sp>
         <p:nvSpPr>
-          <p:cNvPr id="177" name="Google Shape;177;p24"/>
+          <p:cNvPr id="179" name="Google Shape;179;p24"/>
           <p:cNvSpPr txBox="1"/>
           <p:nvPr>
             <p:ph idx="1" type="body"/>
@@ -11956,7 +11956,7 @@
       </p:sp>
       <p:sp>
         <p:nvSpPr>
-          <p:cNvPr id="178" name="Google Shape;178;p24"/>
+          <p:cNvPr id="180" name="Google Shape;180;p24"/>
           <p:cNvSpPr txBox="1"/>
           <p:nvPr>
             <p:ph idx="12" type="sldNum"/>
@@ -11996,7 +11996,7 @@
       </p:sp>
       <p:pic>
         <p:nvPicPr>
-          <p:cNvPr id="179" name="Google Shape;179;p24"/>
+          <p:cNvPr id="181" name="Google Shape;181;p24"/>
           <p:cNvPicPr preferRelativeResize="0"/>
           <p:nvPr/>
         </p:nvPicPr>
@@ -12035,7 +12035,7 @@
   <p:cSld>
     <p:spTree>
       <p:nvGrpSpPr>
-        <p:cNvPr id="183" name="Shape 183"/>
+        <p:cNvPr id="185" name="Shape 185"/>
         <p:cNvGrpSpPr/>
         <p:nvPr/>
       </p:nvGrpSpPr>
@@ -12049,7 +12049,7 @@
       </p:grpSpPr>
       <p:sp>
         <p:nvSpPr>
-          <p:cNvPr id="184" name="Google Shape;184;p25"/>
+          <p:cNvPr id="186" name="Google Shape;186;p25"/>
           <p:cNvSpPr txBox="1"/>
           <p:nvPr>
             <p:ph idx="1" type="body"/>
@@ -12192,7 +12192,7 @@
       </p:sp>
       <p:sp>
         <p:nvSpPr>
-          <p:cNvPr id="185" name="Google Shape;185;p25"/>
+          <p:cNvPr id="187" name="Google Shape;187;p25"/>
           <p:cNvSpPr txBox="1"/>
           <p:nvPr>
             <p:ph type="title"/>
@@ -12232,7 +12232,7 @@
       </p:sp>
       <p:sp>
         <p:nvSpPr>
-          <p:cNvPr id="186" name="Google Shape;186;p25"/>
+          <p:cNvPr id="188" name="Google Shape;188;p25"/>
           <p:cNvSpPr txBox="1"/>
           <p:nvPr>
             <p:ph idx="12" type="sldNum"/>
@@ -12272,7 +12272,7 @@
       </p:sp>
       <p:pic>
         <p:nvPicPr>
-          <p:cNvPr id="187" name="Google Shape;187;p25"/>
+          <p:cNvPr id="189" name="Google Shape;189;p25"/>
           <p:cNvPicPr preferRelativeResize="0"/>
           <p:nvPr/>
         </p:nvPicPr>
@@ -12311,7 +12311,7 @@
   <p:cSld>
     <p:spTree>
       <p:nvGrpSpPr>
-        <p:cNvPr id="191" name="Shape 191"/>
+        <p:cNvPr id="193" name="Shape 193"/>
         <p:cNvGrpSpPr/>
         <p:nvPr/>
       </p:nvGrpSpPr>
@@ -12325,7 +12325,7 @@
       </p:grpSpPr>
       <p:sp>
         <p:nvSpPr>
-          <p:cNvPr id="192" name="Google Shape;192;p26"/>
+          <p:cNvPr id="194" name="Google Shape;194;p26"/>
           <p:cNvSpPr txBox="1"/>
           <p:nvPr>
             <p:ph type="title"/>
@@ -12381,7 +12381,7 @@
       </p:sp>
       <p:sp>
         <p:nvSpPr>
-          <p:cNvPr id="193" name="Google Shape;193;p26"/>
+          <p:cNvPr id="195" name="Google Shape;195;p26"/>
           <p:cNvSpPr txBox="1"/>
           <p:nvPr>
             <p:ph idx="12" type="sldNum"/>
@@ -12432,7 +12432,7 @@
   <p:cSld>
     <p:spTree>
       <p:nvGrpSpPr>
-        <p:cNvPr id="197" name="Shape 197"/>
+        <p:cNvPr id="199" name="Shape 199"/>
         <p:cNvGrpSpPr/>
         <p:nvPr/>
       </p:nvGrpSpPr>
@@ -12446,7 +12446,7 @@
       </p:grpSpPr>
       <p:sp>
         <p:nvSpPr>
-          <p:cNvPr id="198" name="Google Shape;198;p27"/>
+          <p:cNvPr id="200" name="Google Shape;200;p27"/>
           <p:cNvSpPr txBox="1"/>
           <p:nvPr>
             <p:ph type="title"/>
@@ -12486,7 +12486,7 @@
       </p:sp>
       <p:sp>
         <p:nvSpPr>
-          <p:cNvPr id="199" name="Google Shape;199;p27"/>
+          <p:cNvPr id="201" name="Google Shape;201;p27"/>
           <p:cNvSpPr txBox="1"/>
           <p:nvPr>
             <p:ph idx="1" type="body"/>
@@ -12596,7 +12596,7 @@
       </p:sp>
       <p:sp>
         <p:nvSpPr>
-          <p:cNvPr id="200" name="Google Shape;200;p27"/>
+          <p:cNvPr id="202" name="Google Shape;202;p27"/>
           <p:cNvSpPr txBox="1"/>
           <p:nvPr>
             <p:ph idx="12" type="sldNum"/>
@@ -12636,7 +12636,7 @@
       </p:sp>
       <p:pic>
         <p:nvPicPr>
-          <p:cNvPr id="201" name="Google Shape;201;p27" title="1_NxXw72-CDGp7b7pz2kga5g-removebg-preview.png"/>
+          <p:cNvPr id="203" name="Google Shape;203;p27" title="1_NxXw72-CDGp7b7pz2kga5g-removebg-preview.png"/>
           <p:cNvPicPr preferRelativeResize="0"/>
           <p:nvPr/>
         </p:nvPicPr>
@@ -12675,7 +12675,7 @@
   <p:cSld>
     <p:spTree>
       <p:nvGrpSpPr>
-        <p:cNvPr id="205" name="Shape 205"/>
+        <p:cNvPr id="207" name="Shape 207"/>
         <p:cNvGrpSpPr/>
         <p:nvPr/>
       </p:nvGrpSpPr>
@@ -12689,7 +12689,7 @@
       </p:grpSpPr>
       <p:sp>
         <p:nvSpPr>
-          <p:cNvPr id="206" name="Google Shape;206;p28"/>
+          <p:cNvPr id="208" name="Google Shape;208;p28"/>
           <p:cNvSpPr txBox="1"/>
           <p:nvPr>
             <p:ph type="title"/>
@@ -12729,7 +12729,7 @@
       </p:sp>
       <p:sp>
         <p:nvSpPr>
-          <p:cNvPr id="207" name="Google Shape;207;p28"/>
+          <p:cNvPr id="209" name="Google Shape;209;p28"/>
           <p:cNvSpPr txBox="1"/>
           <p:nvPr>
             <p:ph idx="1" type="body"/>
@@ -12778,7 +12778,7 @@
       </p:sp>
       <p:sp>
         <p:nvSpPr>
-          <p:cNvPr id="208" name="Google Shape;208;p28"/>
+          <p:cNvPr id="210" name="Google Shape;210;p28"/>
           <p:cNvSpPr txBox="1"/>
           <p:nvPr>
             <p:ph idx="12" type="sldNum"/>
@@ -12818,7 +12818,7 @@
       </p:sp>
       <p:pic>
         <p:nvPicPr>
-          <p:cNvPr id="209" name="Google Shape;209;p28"/>
+          <p:cNvPr id="211" name="Google Shape;211;p28"/>
           <p:cNvPicPr preferRelativeResize="0"/>
           <p:nvPr/>
         </p:nvPicPr>
@@ -12846,7 +12846,7 @@
       </p:pic>
       <p:sp>
         <p:nvSpPr>
-          <p:cNvPr id="210" name="Google Shape;210;p28"/>
+          <p:cNvPr id="212" name="Google Shape;212;p28"/>
           <p:cNvSpPr txBox="1"/>
           <p:nvPr>
             <p:ph idx="1" type="body"/>
@@ -12955,7 +12955,7 @@
   <p:cSld>
     <p:spTree>
       <p:nvGrpSpPr>
-        <p:cNvPr id="214" name="Shape 214"/>
+        <p:cNvPr id="216" name="Shape 216"/>
         <p:cNvGrpSpPr/>
         <p:nvPr/>
       </p:nvGrpSpPr>
@@ -12969,7 +12969,7 @@
       </p:grpSpPr>
       <p:sp>
         <p:nvSpPr>
-          <p:cNvPr id="215" name="Google Shape;215;p29"/>
+          <p:cNvPr id="217" name="Google Shape;217;p29"/>
           <p:cNvSpPr txBox="1"/>
           <p:nvPr>
             <p:ph idx="1" type="body"/>
@@ -13051,7 +13051,7 @@
       </p:sp>
       <p:sp>
         <p:nvSpPr>
-          <p:cNvPr id="216" name="Google Shape;216;p29"/>
+          <p:cNvPr id="218" name="Google Shape;218;p29"/>
           <p:cNvSpPr txBox="1"/>
           <p:nvPr>
             <p:ph type="title"/>
@@ -13091,7 +13091,7 @@
       </p:sp>
       <p:sp>
         <p:nvSpPr>
-          <p:cNvPr id="217" name="Google Shape;217;p29"/>
+          <p:cNvPr id="219" name="Google Shape;219;p29"/>
           <p:cNvSpPr txBox="1"/>
           <p:nvPr>
             <p:ph idx="1" type="body"/>
@@ -13148,7 +13148,7 @@
       </p:sp>
       <p:sp>
         <p:nvSpPr>
-          <p:cNvPr id="218" name="Google Shape;218;p29"/>
+          <p:cNvPr id="220" name="Google Shape;220;p29"/>
           <p:cNvSpPr txBox="1"/>
           <p:nvPr>
             <p:ph idx="12" type="sldNum"/>
@@ -13188,7 +13188,7 @@
       </p:sp>
       <p:pic>
         <p:nvPicPr>
-          <p:cNvPr id="219" name="Google Shape;219;p29"/>
+          <p:cNvPr id="221" name="Google Shape;221;p29"/>
           <p:cNvPicPr preferRelativeResize="0"/>
           <p:nvPr/>
         </p:nvPicPr>
@@ -13227,7 +13227,7 @@
   <p:cSld>
     <p:spTree>
       <p:nvGrpSpPr>
-        <p:cNvPr id="223" name="Shape 223"/>
+        <p:cNvPr id="225" name="Shape 225"/>
         <p:cNvGrpSpPr/>
         <p:nvPr/>
       </p:nvGrpSpPr>
@@ -13241,7 +13241,7 @@
       </p:grpSpPr>
       <p:sp>
         <p:nvSpPr>
-          <p:cNvPr id="224" name="Google Shape;224;p30"/>
+          <p:cNvPr id="226" name="Google Shape;226;p30"/>
           <p:cNvSpPr txBox="1"/>
           <p:nvPr>
             <p:ph type="title"/>
@@ -13297,7 +13297,7 @@
       </p:sp>
       <p:sp>
         <p:nvSpPr>
-          <p:cNvPr id="225" name="Google Shape;225;p30"/>
+          <p:cNvPr id="227" name="Google Shape;227;p30"/>
           <p:cNvSpPr txBox="1"/>
           <p:nvPr>
             <p:ph idx="12" type="sldNum"/>
@@ -13348,7 +13348,7 @@
   <p:cSld>
     <p:spTree>
       <p:nvGrpSpPr>
-        <p:cNvPr id="229" name="Shape 229"/>
+        <p:cNvPr id="231" name="Shape 231"/>
         <p:cNvGrpSpPr/>
         <p:nvPr/>
       </p:nvGrpSpPr>
@@ -13362,7 +13362,7 @@
       </p:grpSpPr>
       <p:sp>
         <p:nvSpPr>
-          <p:cNvPr id="230" name="Google Shape;230;p31"/>
+          <p:cNvPr id="232" name="Google Shape;232;p31"/>
           <p:cNvSpPr txBox="1"/>
           <p:nvPr>
             <p:ph type="title"/>
@@ -13406,7 +13406,7 @@
       </p:sp>
       <p:sp>
         <p:nvSpPr>
-          <p:cNvPr id="231" name="Google Shape;231;p31"/>
+          <p:cNvPr id="233" name="Google Shape;233;p31"/>
           <p:cNvSpPr txBox="1"/>
           <p:nvPr>
             <p:ph idx="12" type="sldNum"/>
@@ -13446,7 +13446,7 @@
       </p:sp>
       <p:sp>
         <p:nvSpPr>
-          <p:cNvPr id="232" name="Google Shape;232;p31"/>
+          <p:cNvPr id="234" name="Google Shape;234;p31"/>
           <p:cNvSpPr txBox="1"/>
           <p:nvPr>
             <p:ph idx="1" type="body"/>
@@ -13508,7 +13508,7 @@
       </p:sp>
       <p:pic>
         <p:nvPicPr>
-          <p:cNvPr id="233" name="Google Shape;233;p31" title="mnist-3.0.1-removebg-preview.png"/>
+          <p:cNvPr id="235" name="Google Shape;235;p31" title="mnist-3.0.1-removebg-preview.png"/>
           <p:cNvPicPr preferRelativeResize="0"/>
           <p:nvPr/>
         </p:nvPicPr>
@@ -13594,7 +13594,7 @@
             </a:pPr>
             <a:r>
               <a:rPr lang="it" sz="2840"/>
-              <a:t>Spiking Neural Network Simulators</a:t>
+              <a:t>Roadmap</a:t>
             </a:r>
             <a:endParaRPr sz="2840"/>
           </a:p>
@@ -13634,10 +13634,10 @@
               <a:buChar char="●"/>
             </a:pPr>
             <a:r>
-              <a:rPr lang="it" sz="1600"/>
-              <a:t>Scalabilità;</a:t>
-            </a:r>
-            <a:endParaRPr sz="1600"/>
+              <a:rPr lang="it"/>
+              <a:t>Installazione snnTorch;</a:t>
+            </a:r>
+            <a:endParaRPr/>
           </a:p>
           <a:p>
             <a:pPr indent="-330200" lvl="0" marL="457200" rtl="0" algn="just">
@@ -13651,14 +13651,10 @@
               <a:buChar char="●"/>
             </a:pPr>
             <a:r>
-              <a:rPr lang="it" sz="1600"/>
-              <a:t>Astrazione del</a:t>
-            </a:r>
-            <a:r>
-              <a:rPr lang="it" sz="1600"/>
-              <a:t>la complessità hardware;</a:t>
-            </a:r>
-            <a:endParaRPr sz="1600"/>
+              <a:rPr lang="it"/>
+              <a:t>Creare un neurone (caratteristiche e parametri);</a:t>
+            </a:r>
+            <a:endParaRPr/>
           </a:p>
           <a:p>
             <a:pPr indent="-330200" lvl="0" marL="457200" rtl="0" algn="just">
@@ -13672,10 +13668,10 @@
               <a:buChar char="●"/>
             </a:pPr>
             <a:r>
-              <a:rPr lang="it" sz="1600"/>
-              <a:t>Analisi dettagliata del comportamento di neuroni e sinapsi;</a:t>
-            </a:r>
-            <a:endParaRPr sz="1600"/>
+              <a:rPr lang="it"/>
+              <a:t>Creare ed allenare una rete;</a:t>
+            </a:r>
+            <a:endParaRPr/>
           </a:p>
           <a:p>
             <a:pPr indent="-330200" lvl="0" marL="457200" rtl="0" algn="just">
@@ -13689,25 +13685,171 @@
               <a:buChar char="●"/>
             </a:pPr>
             <a:r>
-              <a:rPr lang="it" sz="1600"/>
-              <a:t>Confronti tra diverse architetture</a:t>
-            </a:r>
-            <a:r>
-              <a:rPr lang="it" sz="1600"/>
-              <a:t>.</a:t>
-            </a:r>
-            <a:endParaRPr sz="1600"/>
+              <a:rPr lang="it"/>
+              <a:t>Classificazione su MNIST;</a:t>
+            </a:r>
+            <a:endParaRPr/>
+          </a:p>
+          <a:p>
+            <a:pPr indent="-330200" lvl="0" marL="457200" rtl="0" algn="just">
+              <a:spcBef>
+                <a:spcPts val="0"/>
+              </a:spcBef>
+              <a:spcAft>
+                <a:spcPts val="0"/>
+              </a:spcAft>
+              <a:buSzPts val="1600"/>
+              <a:buChar char="●"/>
+            </a:pPr>
+            <a:r>
+              <a:rPr lang="it"/>
+              <a:t>Riconoscimento pattern temporali;</a:t>
+            </a:r>
+            <a:endParaRPr/>
+          </a:p>
+          <a:p>
+            <a:pPr indent="-330200" lvl="0" marL="457200" rtl="0" algn="just">
+              <a:spcBef>
+                <a:spcPts val="0"/>
+              </a:spcBef>
+              <a:spcAft>
+                <a:spcPts val="0"/>
+              </a:spcAft>
+              <a:buSzPts val="1600"/>
+              <a:buChar char="●"/>
+            </a:pPr>
+            <a:r>
+              <a:rPr lang="it"/>
+              <a:t>Anomaly Detection;</a:t>
+            </a:r>
+            <a:endParaRPr/>
+          </a:p>
+          <a:p>
+            <a:pPr indent="-330200" lvl="0" marL="457200" rtl="0" algn="just">
+              <a:spcBef>
+                <a:spcPts val="0"/>
+              </a:spcBef>
+              <a:spcAft>
+                <a:spcPts val="0"/>
+              </a:spcAft>
+              <a:buSzPts val="1600"/>
+              <a:buChar char="●"/>
+            </a:pPr>
+            <a:r>
+              <a:rPr lang="it"/>
+              <a:t>Online Learning con Robot.</a:t>
+            </a:r>
+            <a:endParaRPr/>
+          </a:p>
+        </p:txBody>
+      </p:sp>
+      <p:sp>
+        <p:nvSpPr>
+          <p:cNvPr id="94" name="Google Shape;94;p14"/>
+          <p:cNvSpPr txBox="1"/>
+          <p:nvPr>
+            <p:ph idx="12" type="sldNum"/>
+          </p:nvPr>
+        </p:nvSpPr>
+        <p:spPr>
+          <a:xfrm>
+            <a:off x="8536302" y="4749851"/>
+            <a:ext cx="548700" cy="393600"/>
+          </a:xfrm>
+          <a:prstGeom prst="rect">
+            <a:avLst/>
+          </a:prstGeom>
+        </p:spPr>
+        <p:txBody>
+          <a:bodyPr anchorCtr="0" anchor="ctr" bIns="91425" lIns="91425" spcFirstLastPara="1" rIns="91425" wrap="square" tIns="91425">
+            <a:normAutofit/>
+          </a:bodyPr>
+          <a:lstStyle/>
+          <a:p>
+            <a:pPr indent="0" lvl="0" marL="0" rtl="0" algn="r">
+              <a:spcBef>
+                <a:spcPts val="0"/>
+              </a:spcBef>
+              <a:spcAft>
+                <a:spcPts val="0"/>
+              </a:spcAft>
+              <a:buNone/>
+            </a:pPr>
+            <a:fld id="{00000000-1234-1234-1234-123412341234}" type="slidenum">
+              <a:rPr lang="it"/>
+              <a:t>‹#›</a:t>
+            </a:fld>
+            <a:endParaRPr/>
+          </a:p>
+        </p:txBody>
+      </p:sp>
+      <p:sp>
+        <p:nvSpPr>
+          <p:cNvPr id="95" name="Google Shape;95;p14"/>
+          <p:cNvSpPr txBox="1"/>
+          <p:nvPr/>
+        </p:nvSpPr>
+        <p:spPr>
+          <a:xfrm>
+            <a:off x="729400" y="4565300"/>
+            <a:ext cx="7688700" cy="421500"/>
+          </a:xfrm>
+          <a:prstGeom prst="rect">
+            <a:avLst/>
+          </a:prstGeom>
+          <a:noFill/>
+          <a:ln>
+            <a:noFill/>
+          </a:ln>
+        </p:spPr>
+        <p:txBody>
+          <a:bodyPr anchorCtr="0" anchor="t" bIns="91425" lIns="91425" spcFirstLastPara="1" rIns="91425" wrap="square" tIns="91425">
+            <a:noAutofit/>
+          </a:bodyPr>
+          <a:lstStyle/>
+          <a:p>
+            <a:pPr indent="0" lvl="0" marL="0" rtl="0" algn="ctr">
+              <a:spcBef>
+                <a:spcPts val="0"/>
+              </a:spcBef>
+              <a:spcAft>
+                <a:spcPts val="0"/>
+              </a:spcAft>
+              <a:buNone/>
+            </a:pPr>
+            <a:r>
+              <a:rPr lang="it" u="sng">
+                <a:solidFill>
+                  <a:schemeClr val="hlink"/>
+                </a:solidFill>
+                <a:latin typeface="Lato"/>
+                <a:ea typeface="Lato"/>
+                <a:cs typeface="Lato"/>
+                <a:sym typeface="Lato"/>
+                <a:hlinkClick r:id="rId3"/>
+              </a:rPr>
+              <a:t>https://github.com/AutomationLab-Unime/BioIng_SNN_Slides</a:t>
+            </a:r>
+            <a:endParaRPr>
+              <a:solidFill>
+                <a:schemeClr val="accent1"/>
+              </a:solidFill>
+              <a:latin typeface="Lato"/>
+              <a:ea typeface="Lato"/>
+              <a:cs typeface="Lato"/>
+              <a:sym typeface="Lato"/>
+            </a:endParaRPr>
           </a:p>
         </p:txBody>
       </p:sp>
       <p:pic>
         <p:nvPicPr>
-          <p:cNvPr id="94" name="Google Shape;94;p14"/>
+          <p:cNvPr id="96" name="Google Shape;96;p14" title="frame.png"/>
           <p:cNvPicPr preferRelativeResize="0"/>
           <p:nvPr/>
         </p:nvPicPr>
         <p:blipFill>
-          <a:blip r:embed="rId3">
+          <a:blip r:embed="rId4">
             <a:alphaModFix/>
           </a:blip>
           <a:stretch>
@@ -13716,8 +13858,8 @@
         </p:blipFill>
         <p:spPr>
           <a:xfrm>
-            <a:off x="3842188" y="3840600"/>
-            <a:ext cx="2196450" cy="914250"/>
+            <a:off x="6021500" y="2078875"/>
+            <a:ext cx="2169550" cy="2169550"/>
           </a:xfrm>
           <a:prstGeom prst="rect">
             <a:avLst/>
@@ -13728,128 +13870,6 @@
           </a:ln>
         </p:spPr>
       </p:pic>
-      <p:pic>
-        <p:nvPicPr>
-          <p:cNvPr id="95" name="Google Shape;95;p14"/>
-          <p:cNvPicPr preferRelativeResize="0"/>
-          <p:nvPr/>
-        </p:nvPicPr>
-        <p:blipFill rotWithShape="1">
-          <a:blip r:embed="rId4">
-            <a:alphaModFix/>
-          </a:blip>
-          <a:srcRect b="28062" l="0" r="0" t="27520"/>
-          <a:stretch/>
-        </p:blipFill>
-        <p:spPr>
-          <a:xfrm>
-            <a:off x="1001050" y="3436675"/>
-            <a:ext cx="2409901" cy="535200"/>
-          </a:xfrm>
-          <a:prstGeom prst="rect">
-            <a:avLst/>
-          </a:prstGeom>
-          <a:noFill/>
-          <a:ln>
-            <a:noFill/>
-          </a:ln>
-        </p:spPr>
-      </p:pic>
-      <p:pic>
-        <p:nvPicPr>
-          <p:cNvPr id="96" name="Google Shape;96;p14"/>
-          <p:cNvPicPr preferRelativeResize="0"/>
-          <p:nvPr/>
-        </p:nvPicPr>
-        <p:blipFill rotWithShape="1">
-          <a:blip r:embed="rId5">
-            <a:alphaModFix/>
-          </a:blip>
-          <a:srcRect b="30766" l="0" r="0" t="27329"/>
-          <a:stretch/>
-        </p:blipFill>
-        <p:spPr>
-          <a:xfrm>
-            <a:off x="6808350" y="2117525"/>
-            <a:ext cx="1609800" cy="674550"/>
-          </a:xfrm>
-          <a:prstGeom prst="rect">
-            <a:avLst/>
-          </a:prstGeom>
-          <a:noFill/>
-          <a:ln>
-            <a:noFill/>
-          </a:ln>
-        </p:spPr>
-      </p:pic>
-      <p:pic>
-        <p:nvPicPr>
-          <p:cNvPr id="97" name="Google Shape;97;p14"/>
-          <p:cNvPicPr preferRelativeResize="0"/>
-          <p:nvPr/>
-        </p:nvPicPr>
-        <p:blipFill>
-          <a:blip r:embed="rId6">
-            <a:alphaModFix/>
-          </a:blip>
-          <a:stretch>
-            <a:fillRect/>
-          </a:stretch>
-        </p:blipFill>
-        <p:spPr>
-          <a:xfrm>
-            <a:off x="6747475" y="3205000"/>
-            <a:ext cx="1731534" cy="914250"/>
-          </a:xfrm>
-          <a:prstGeom prst="rect">
-            <a:avLst/>
-          </a:prstGeom>
-          <a:noFill/>
-          <a:ln>
-            <a:noFill/>
-          </a:ln>
-        </p:spPr>
-      </p:pic>
-      <p:sp>
-        <p:nvSpPr>
-          <p:cNvPr id="98" name="Google Shape;98;p14"/>
-          <p:cNvSpPr txBox="1"/>
-          <p:nvPr>
-            <p:ph idx="12" type="sldNum"/>
-          </p:nvPr>
-        </p:nvSpPr>
-        <p:spPr>
-          <a:xfrm>
-            <a:off x="8536302" y="4749851"/>
-            <a:ext cx="548700" cy="393600"/>
-          </a:xfrm>
-          <a:prstGeom prst="rect">
-            <a:avLst/>
-          </a:prstGeom>
-        </p:spPr>
-        <p:txBody>
-          <a:bodyPr anchorCtr="0" anchor="ctr" bIns="91425" lIns="91425" spcFirstLastPara="1" rIns="91425" wrap="square" tIns="91425">
-            <a:normAutofit/>
-          </a:bodyPr>
-          <a:lstStyle/>
-          <a:p>
-            <a:pPr indent="0" lvl="0" marL="0" rtl="0" algn="r">
-              <a:spcBef>
-                <a:spcPts val="0"/>
-              </a:spcBef>
-              <a:spcAft>
-                <a:spcPts val="0"/>
-              </a:spcAft>
-              <a:buNone/>
-            </a:pPr>
-            <a:fld id="{00000000-1234-1234-1234-123412341234}" type="slidenum">
-              <a:rPr lang="it"/>
-              <a:t>‹#›</a:t>
-            </a:fld>
-            <a:endParaRPr/>
-          </a:p>
-        </p:txBody>
-      </p:sp>
     </p:spTree>
   </p:cSld>
   <p:clrMapOvr>
@@ -13863,7 +13883,7 @@
   <p:cSld>
     <p:spTree>
       <p:nvGrpSpPr>
-        <p:cNvPr id="237" name="Shape 237"/>
+        <p:cNvPr id="239" name="Shape 239"/>
         <p:cNvGrpSpPr/>
         <p:nvPr/>
       </p:nvGrpSpPr>
@@ -13877,7 +13897,7 @@
       </p:grpSpPr>
       <p:sp>
         <p:nvSpPr>
-          <p:cNvPr id="238" name="Google Shape;238;p32"/>
+          <p:cNvPr id="240" name="Google Shape;240;p32"/>
           <p:cNvSpPr txBox="1"/>
           <p:nvPr>
             <p:ph type="title"/>
@@ -13917,7 +13937,7 @@
       </p:sp>
       <p:sp>
         <p:nvSpPr>
-          <p:cNvPr id="239" name="Google Shape;239;p32"/>
+          <p:cNvPr id="241" name="Google Shape;241;p32"/>
           <p:cNvSpPr txBox="1"/>
           <p:nvPr>
             <p:ph idx="12" type="sldNum"/>
@@ -13957,7 +13977,7 @@
       </p:sp>
       <p:sp>
         <p:nvSpPr>
-          <p:cNvPr id="240" name="Google Shape;240;p32"/>
+          <p:cNvPr id="242" name="Google Shape;242;p32"/>
           <p:cNvSpPr txBox="1"/>
           <p:nvPr>
             <p:ph idx="1" type="body"/>
@@ -14089,7 +14109,7 @@
       </p:sp>
       <p:pic>
         <p:nvPicPr>
-          <p:cNvPr id="241" name="Google Shape;241;p32" title="2_8_fcn-removebg-preview.png"/>
+          <p:cNvPr id="243" name="Google Shape;243;p32" title="2_8_fcn-removebg-preview.png"/>
           <p:cNvPicPr preferRelativeResize="0"/>
           <p:nvPr/>
         </p:nvPicPr>
@@ -14116,7 +14136,7 @@
       </p:pic>
       <p:cxnSp>
         <p:nvCxnSpPr>
-          <p:cNvPr id="242" name="Google Shape;242;p32"/>
+          <p:cNvPr id="244" name="Google Shape;244;p32"/>
           <p:cNvCxnSpPr/>
           <p:nvPr/>
         </p:nvCxnSpPr>
@@ -14142,7 +14162,7 @@
       </p:cxnSp>
       <p:cxnSp>
         <p:nvCxnSpPr>
-          <p:cNvPr id="243" name="Google Shape;243;p32"/>
+          <p:cNvPr id="245" name="Google Shape;245;p32"/>
           <p:cNvCxnSpPr/>
           <p:nvPr/>
         </p:nvCxnSpPr>
@@ -14168,7 +14188,7 @@
       </p:cxnSp>
       <p:cxnSp>
         <p:nvCxnSpPr>
-          <p:cNvPr id="244" name="Google Shape;244;p32"/>
+          <p:cNvPr id="246" name="Google Shape;246;p32"/>
           <p:cNvCxnSpPr/>
           <p:nvPr/>
         </p:nvCxnSpPr>
@@ -14205,7 +14225,7 @@
   <p:cSld>
     <p:spTree>
       <p:nvGrpSpPr>
-        <p:cNvPr id="248" name="Shape 248"/>
+        <p:cNvPr id="250" name="Shape 250"/>
         <p:cNvGrpSpPr/>
         <p:nvPr/>
       </p:nvGrpSpPr>
@@ -14219,7 +14239,7 @@
       </p:grpSpPr>
       <p:sp>
         <p:nvSpPr>
-          <p:cNvPr id="249" name="Google Shape;249;p33"/>
+          <p:cNvPr id="251" name="Google Shape;251;p33"/>
           <p:cNvSpPr txBox="1"/>
           <p:nvPr>
             <p:ph type="title"/>
@@ -14259,7 +14279,7 @@
       </p:sp>
       <p:sp>
         <p:nvSpPr>
-          <p:cNvPr id="250" name="Google Shape;250;p33"/>
+          <p:cNvPr id="252" name="Google Shape;252;p33"/>
           <p:cNvSpPr txBox="1"/>
           <p:nvPr>
             <p:ph idx="12" type="sldNum"/>
@@ -14299,7 +14319,7 @@
       </p:sp>
       <p:sp>
         <p:nvSpPr>
-          <p:cNvPr id="251" name="Google Shape;251;p33"/>
+          <p:cNvPr id="253" name="Google Shape;253;p33"/>
           <p:cNvSpPr txBox="1"/>
           <p:nvPr>
             <p:ph idx="1" type="body"/>
@@ -14390,7 +14410,7 @@
       </p:sp>
       <p:pic>
         <p:nvPicPr>
-          <p:cNvPr id="252" name="Google Shape;252;p33"/>
+          <p:cNvPr id="254" name="Google Shape;254;p33"/>
           <p:cNvPicPr preferRelativeResize="0"/>
           <p:nvPr/>
         </p:nvPicPr>
@@ -14429,7 +14449,7 @@
   <p:cSld>
     <p:spTree>
       <p:nvGrpSpPr>
-        <p:cNvPr id="256" name="Shape 256"/>
+        <p:cNvPr id="258" name="Shape 258"/>
         <p:cNvGrpSpPr/>
         <p:nvPr/>
       </p:nvGrpSpPr>
@@ -14443,7 +14463,7 @@
       </p:grpSpPr>
       <p:sp>
         <p:nvSpPr>
-          <p:cNvPr id="257" name="Google Shape;257;p34"/>
+          <p:cNvPr id="259" name="Google Shape;259;p34"/>
           <p:cNvSpPr txBox="1"/>
           <p:nvPr>
             <p:ph type="title"/>
@@ -14483,7 +14503,7 @@
       </p:sp>
       <p:sp>
         <p:nvSpPr>
-          <p:cNvPr id="258" name="Google Shape;258;p34"/>
+          <p:cNvPr id="260" name="Google Shape;260;p34"/>
           <p:cNvSpPr txBox="1"/>
           <p:nvPr>
             <p:ph idx="12" type="sldNum"/>
@@ -14523,7 +14543,7 @@
       </p:sp>
       <p:sp>
         <p:nvSpPr>
-          <p:cNvPr id="259" name="Google Shape;259;p34"/>
+          <p:cNvPr id="261" name="Google Shape;261;p34"/>
           <p:cNvSpPr txBox="1"/>
           <p:nvPr>
             <p:ph idx="1" type="body"/>
@@ -14665,7 +14685,7 @@
       </p:sp>
       <p:pic>
         <p:nvPicPr>
-          <p:cNvPr id="260" name="Google Shape;260;p34"/>
+          <p:cNvPr id="262" name="Google Shape;262;p34"/>
           <p:cNvPicPr preferRelativeResize="0"/>
           <p:nvPr/>
         </p:nvPicPr>
@@ -14704,7 +14724,7 @@
   <p:cSld>
     <p:spTree>
       <p:nvGrpSpPr>
-        <p:cNvPr id="264" name="Shape 264"/>
+        <p:cNvPr id="266" name="Shape 266"/>
         <p:cNvGrpSpPr/>
         <p:nvPr/>
       </p:nvGrpSpPr>
@@ -14718,7 +14738,7 @@
       </p:grpSpPr>
       <p:sp>
         <p:nvSpPr>
-          <p:cNvPr id="265" name="Google Shape;265;p35"/>
+          <p:cNvPr id="267" name="Google Shape;267;p35"/>
           <p:cNvSpPr txBox="1"/>
           <p:nvPr>
             <p:ph type="title"/>
@@ -14758,7 +14778,7 @@
       </p:sp>
       <p:sp>
         <p:nvSpPr>
-          <p:cNvPr id="266" name="Google Shape;266;p35"/>
+          <p:cNvPr id="268" name="Google Shape;268;p35"/>
           <p:cNvSpPr txBox="1"/>
           <p:nvPr>
             <p:ph idx="12" type="sldNum"/>
@@ -14798,7 +14818,7 @@
       </p:sp>
       <p:sp>
         <p:nvSpPr>
-          <p:cNvPr id="267" name="Google Shape;267;p35"/>
+          <p:cNvPr id="269" name="Google Shape;269;p35"/>
           <p:cNvSpPr txBox="1"/>
           <p:nvPr>
             <p:ph idx="1" type="body"/>
@@ -14913,7 +14933,7 @@
       </p:sp>
       <p:pic>
         <p:nvPicPr>
-          <p:cNvPr id="268" name="Google Shape;268;p35" title="Spike-Function-and-Surrogate-Gradient-Function-removebg-preview.png"/>
+          <p:cNvPr id="270" name="Google Shape;270;p35" title="Spike-Function-and-Surrogate-Gradient-Function-removebg-preview.png"/>
           <p:cNvPicPr preferRelativeResize="0"/>
           <p:nvPr/>
         </p:nvPicPr>
@@ -14952,7 +14972,7 @@
   <p:cSld>
     <p:spTree>
       <p:nvGrpSpPr>
-        <p:cNvPr id="272" name="Shape 272"/>
+        <p:cNvPr id="274" name="Shape 274"/>
         <p:cNvGrpSpPr/>
         <p:nvPr/>
       </p:nvGrpSpPr>
@@ -14966,7 +14986,7 @@
       </p:grpSpPr>
       <p:sp>
         <p:nvSpPr>
-          <p:cNvPr id="273" name="Google Shape;273;p36"/>
+          <p:cNvPr id="275" name="Google Shape;275;p36"/>
           <p:cNvSpPr txBox="1"/>
           <p:nvPr>
             <p:ph type="title"/>
@@ -15022,7 +15042,7 @@
       </p:sp>
       <p:sp>
         <p:nvSpPr>
-          <p:cNvPr id="274" name="Google Shape;274;p36"/>
+          <p:cNvPr id="276" name="Google Shape;276;p36"/>
           <p:cNvSpPr txBox="1"/>
           <p:nvPr>
             <p:ph idx="12" type="sldNum"/>
@@ -15073,7 +15093,7 @@
   <p:cSld>
     <p:spTree>
       <p:nvGrpSpPr>
-        <p:cNvPr id="278" name="Shape 278"/>
+        <p:cNvPr id="280" name="Shape 280"/>
         <p:cNvGrpSpPr/>
         <p:nvPr/>
       </p:nvGrpSpPr>
@@ -15087,7 +15107,7 @@
       </p:grpSpPr>
       <p:sp>
         <p:nvSpPr>
-          <p:cNvPr id="279" name="Google Shape;279;p37"/>
+          <p:cNvPr id="281" name="Google Shape;281;p37"/>
           <p:cNvSpPr txBox="1"/>
           <p:nvPr>
             <p:ph type="title"/>
@@ -15127,7 +15147,7 @@
       </p:sp>
       <p:sp>
         <p:nvSpPr>
-          <p:cNvPr id="280" name="Google Shape;280;p37"/>
+          <p:cNvPr id="282" name="Google Shape;282;p37"/>
           <p:cNvSpPr txBox="1"/>
           <p:nvPr>
             <p:ph idx="12" type="sldNum"/>
@@ -15167,7 +15187,7 @@
       </p:sp>
       <p:sp>
         <p:nvSpPr>
-          <p:cNvPr id="281" name="Google Shape;281;p37"/>
+          <p:cNvPr id="283" name="Google Shape;283;p37"/>
           <p:cNvSpPr txBox="1"/>
           <p:nvPr>
             <p:ph idx="1" type="body"/>
@@ -15242,7 +15262,7 @@
       </p:sp>
       <p:pic>
         <p:nvPicPr>
-          <p:cNvPr id="282" name="Google Shape;282;p37"/>
+          <p:cNvPr id="284" name="Google Shape;284;p37"/>
           <p:cNvPicPr preferRelativeResize="0"/>
           <p:nvPr/>
         </p:nvPicPr>
@@ -15281,7 +15301,7 @@
   <p:cSld>
     <p:spTree>
       <p:nvGrpSpPr>
-        <p:cNvPr id="286" name="Shape 286"/>
+        <p:cNvPr id="288" name="Shape 288"/>
         <p:cNvGrpSpPr/>
         <p:nvPr/>
       </p:nvGrpSpPr>
@@ -15295,7 +15315,7 @@
       </p:grpSpPr>
       <p:sp>
         <p:nvSpPr>
-          <p:cNvPr id="287" name="Google Shape;287;p38"/>
+          <p:cNvPr id="289" name="Google Shape;289;p38"/>
           <p:cNvSpPr txBox="1"/>
           <p:nvPr>
             <p:ph type="title"/>
@@ -15335,7 +15355,7 @@
       </p:sp>
       <p:sp>
         <p:nvSpPr>
-          <p:cNvPr id="288" name="Google Shape;288;p38"/>
+          <p:cNvPr id="290" name="Google Shape;290;p38"/>
           <p:cNvSpPr txBox="1"/>
           <p:nvPr>
             <p:ph idx="12" type="sldNum"/>
@@ -15375,7 +15395,7 @@
       </p:sp>
       <p:sp>
         <p:nvSpPr>
-          <p:cNvPr id="289" name="Google Shape;289;p38"/>
+          <p:cNvPr id="291" name="Google Shape;291;p38"/>
           <p:cNvSpPr txBox="1"/>
           <p:nvPr>
             <p:ph idx="1" type="body"/>
@@ -15445,7 +15465,7 @@
       </p:sp>
       <p:pic>
         <p:nvPicPr>
-          <p:cNvPr id="290" name="Google Shape;290;p38"/>
+          <p:cNvPr id="292" name="Google Shape;292;p38"/>
           <p:cNvPicPr preferRelativeResize="0"/>
           <p:nvPr/>
         </p:nvPicPr>
@@ -15484,7 +15504,7 @@
   <p:cSld>
     <p:spTree>
       <p:nvGrpSpPr>
-        <p:cNvPr id="294" name="Shape 294"/>
+        <p:cNvPr id="296" name="Shape 296"/>
         <p:cNvGrpSpPr/>
         <p:nvPr/>
       </p:nvGrpSpPr>
@@ -15498,7 +15518,7 @@
       </p:grpSpPr>
       <p:sp>
         <p:nvSpPr>
-          <p:cNvPr id="295" name="Google Shape;295;p39"/>
+          <p:cNvPr id="297" name="Google Shape;297;p39"/>
           <p:cNvSpPr txBox="1"/>
           <p:nvPr>
             <p:ph type="title"/>
@@ -15538,7 +15558,7 @@
       </p:sp>
       <p:sp>
         <p:nvSpPr>
-          <p:cNvPr id="296" name="Google Shape;296;p39"/>
+          <p:cNvPr id="298" name="Google Shape;298;p39"/>
           <p:cNvSpPr txBox="1"/>
           <p:nvPr>
             <p:ph idx="12" type="sldNum"/>
@@ -15578,7 +15598,7 @@
       </p:sp>
       <p:sp>
         <p:nvSpPr>
-          <p:cNvPr id="297" name="Google Shape;297;p39"/>
+          <p:cNvPr id="299" name="Google Shape;299;p39"/>
           <p:cNvSpPr txBox="1"/>
           <p:nvPr>
             <p:ph idx="1" type="body"/>
@@ -15673,7 +15693,7 @@
       </p:sp>
       <p:pic>
         <p:nvPicPr>
-          <p:cNvPr id="298" name="Google Shape;298;p39"/>
+          <p:cNvPr id="300" name="Google Shape;300;p39"/>
           <p:cNvPicPr preferRelativeResize="0"/>
           <p:nvPr/>
         </p:nvPicPr>
@@ -15712,7 +15732,7 @@
   <p:cSld>
     <p:spTree>
       <p:nvGrpSpPr>
-        <p:cNvPr id="302" name="Shape 302"/>
+        <p:cNvPr id="304" name="Shape 304"/>
         <p:cNvGrpSpPr/>
         <p:nvPr/>
       </p:nvGrpSpPr>
@@ -15726,7 +15746,7 @@
       </p:grpSpPr>
       <p:sp>
         <p:nvSpPr>
-          <p:cNvPr id="303" name="Google Shape;303;p40"/>
+          <p:cNvPr id="305" name="Google Shape;305;p40"/>
           <p:cNvSpPr txBox="1"/>
           <p:nvPr>
             <p:ph type="title"/>
@@ -15766,7 +15786,7 @@
       </p:sp>
       <p:sp>
         <p:nvSpPr>
-          <p:cNvPr id="304" name="Google Shape;304;p40"/>
+          <p:cNvPr id="306" name="Google Shape;306;p40"/>
           <p:cNvSpPr txBox="1"/>
           <p:nvPr>
             <p:ph idx="12" type="sldNum"/>
@@ -15806,7 +15826,7 @@
       </p:sp>
       <p:sp>
         <p:nvSpPr>
-          <p:cNvPr id="305" name="Google Shape;305;p40"/>
+          <p:cNvPr id="307" name="Google Shape;307;p40"/>
           <p:cNvSpPr txBox="1"/>
           <p:nvPr>
             <p:ph idx="1" type="body"/>
@@ -15868,7 +15888,7 @@
       </p:sp>
       <p:pic>
         <p:nvPicPr>
-          <p:cNvPr id="306" name="Google Shape;306;p40"/>
+          <p:cNvPr id="308" name="Google Shape;308;p40"/>
           <p:cNvPicPr preferRelativeResize="0"/>
           <p:nvPr/>
         </p:nvPicPr>
@@ -15907,7 +15927,7 @@
   <p:cSld>
     <p:spTree>
       <p:nvGrpSpPr>
-        <p:cNvPr id="310" name="Shape 310"/>
+        <p:cNvPr id="312" name="Shape 312"/>
         <p:cNvGrpSpPr/>
         <p:nvPr/>
       </p:nvGrpSpPr>
@@ -15921,7 +15941,7 @@
       </p:grpSpPr>
       <p:sp>
         <p:nvSpPr>
-          <p:cNvPr id="311" name="Google Shape;311;p41"/>
+          <p:cNvPr id="313" name="Google Shape;313;p41"/>
           <p:cNvSpPr txBox="1"/>
           <p:nvPr>
             <p:ph type="title"/>
@@ -15977,7 +15997,7 @@
       </p:sp>
       <p:sp>
         <p:nvSpPr>
-          <p:cNvPr id="312" name="Google Shape;312;p41"/>
+          <p:cNvPr id="314" name="Google Shape;314;p41"/>
           <p:cNvSpPr txBox="1"/>
           <p:nvPr>
             <p:ph idx="12" type="sldNum"/>
@@ -16028,7 +16048,7 @@
   <p:cSld>
     <p:spTree>
       <p:nvGrpSpPr>
-        <p:cNvPr id="102" name="Shape 102"/>
+        <p:cNvPr id="100" name="Shape 100"/>
         <p:cNvGrpSpPr/>
         <p:nvPr/>
       </p:nvGrpSpPr>
@@ -16042,7 +16062,7 @@
       </p:grpSpPr>
       <p:sp>
         <p:nvSpPr>
-          <p:cNvPr id="103" name="Google Shape;103;p15"/>
+          <p:cNvPr id="101" name="Google Shape;101;p15"/>
           <p:cNvSpPr txBox="1"/>
           <p:nvPr>
             <p:ph type="title"/>
@@ -16083,47 +16103,107 @@
       </p:sp>
       <p:sp>
         <p:nvSpPr>
-          <p:cNvPr id="104" name="Google Shape;104;p15"/>
+          <p:cNvPr id="102" name="Google Shape;102;p15"/>
           <p:cNvSpPr txBox="1"/>
           <p:nvPr>
-            <p:ph idx="12" type="sldNum"/>
-          </p:nvPr>
-        </p:nvSpPr>
-        <p:spPr>
-          <a:xfrm>
-            <a:off x="8536302" y="4749851"/>
-            <a:ext cx="548700" cy="393600"/>
+            <p:ph idx="1" type="body"/>
+          </p:nvPr>
+        </p:nvSpPr>
+        <p:spPr>
+          <a:xfrm>
+            <a:off x="729450" y="2078875"/>
+            <a:ext cx="7688700" cy="2261100"/>
           </a:xfrm>
           <a:prstGeom prst="rect">
             <a:avLst/>
           </a:prstGeom>
         </p:spPr>
         <p:txBody>
-          <a:bodyPr anchorCtr="0" anchor="ctr" bIns="91425" lIns="91425" spcFirstLastPara="1" rIns="91425" wrap="square" tIns="91425">
+          <a:bodyPr anchorCtr="0" anchor="t" bIns="91425" lIns="91425" spcFirstLastPara="1" rIns="91425" wrap="square" tIns="91425">
             <a:normAutofit/>
           </a:bodyPr>
           <a:lstStyle/>
           <a:p>
-            <a:pPr indent="0" lvl="0" marL="0" rtl="0" algn="r">
-              <a:spcBef>
-                <a:spcPts val="0"/>
-              </a:spcBef>
-              <a:spcAft>
-                <a:spcPts val="0"/>
-              </a:spcAft>
-              <a:buNone/>
-            </a:pPr>
-            <a:fld id="{00000000-1234-1234-1234-123412341234}" type="slidenum">
-              <a:rPr lang="it"/>
-              <a:t>‹#›</a:t>
-            </a:fld>
-            <a:endParaRPr/>
+            <a:pPr indent="-330200" lvl="0" marL="457200" rtl="0" algn="just">
+              <a:spcBef>
+                <a:spcPts val="0"/>
+              </a:spcBef>
+              <a:spcAft>
+                <a:spcPts val="0"/>
+              </a:spcAft>
+              <a:buSzPts val="1600"/>
+              <a:buChar char="●"/>
+            </a:pPr>
+            <a:r>
+              <a:rPr lang="it" sz="1600"/>
+              <a:t>Scalabilità;</a:t>
+            </a:r>
+            <a:endParaRPr sz="1600"/>
+          </a:p>
+          <a:p>
+            <a:pPr indent="-330200" lvl="0" marL="457200" rtl="0" algn="just">
+              <a:spcBef>
+                <a:spcPts val="0"/>
+              </a:spcBef>
+              <a:spcAft>
+                <a:spcPts val="0"/>
+              </a:spcAft>
+              <a:buSzPts val="1600"/>
+              <a:buChar char="●"/>
+            </a:pPr>
+            <a:r>
+              <a:rPr lang="it" sz="1600"/>
+              <a:t>Astrazione del</a:t>
+            </a:r>
+            <a:r>
+              <a:rPr lang="it" sz="1600"/>
+              <a:t>la complessità hardware;</a:t>
+            </a:r>
+            <a:endParaRPr sz="1600"/>
+          </a:p>
+          <a:p>
+            <a:pPr indent="-330200" lvl="0" marL="457200" rtl="0" algn="just">
+              <a:spcBef>
+                <a:spcPts val="0"/>
+              </a:spcBef>
+              <a:spcAft>
+                <a:spcPts val="0"/>
+              </a:spcAft>
+              <a:buSzPts val="1600"/>
+              <a:buChar char="●"/>
+            </a:pPr>
+            <a:r>
+              <a:rPr lang="it" sz="1600"/>
+              <a:t>Analisi dettagliata del comportamento di neuroni e sinapsi;</a:t>
+            </a:r>
+            <a:endParaRPr sz="1600"/>
+          </a:p>
+          <a:p>
+            <a:pPr indent="-330200" lvl="0" marL="457200" rtl="0" algn="just">
+              <a:spcBef>
+                <a:spcPts val="0"/>
+              </a:spcBef>
+              <a:spcAft>
+                <a:spcPts val="0"/>
+              </a:spcAft>
+              <a:buSzPts val="1600"/>
+              <a:buChar char="●"/>
+            </a:pPr>
+            <a:r>
+              <a:rPr lang="it" sz="1600"/>
+              <a:t>Confronti tra diverse architetture</a:t>
+            </a:r>
+            <a:r>
+              <a:rPr lang="it" sz="1600"/>
+              <a:t>.</a:t>
+            </a:r>
+            <a:endParaRPr sz="1600"/>
           </a:p>
         </p:txBody>
       </p:sp>
       <p:pic>
         <p:nvPicPr>
-          <p:cNvPr id="105" name="Google Shape;105;p15"/>
+          <p:cNvPr id="103" name="Google Shape;103;p15"/>
           <p:cNvPicPr preferRelativeResize="0"/>
           <p:nvPr/>
         </p:nvPicPr>
@@ -16137,8 +16217,8 @@
         </p:blipFill>
         <p:spPr>
           <a:xfrm>
-            <a:off x="729450" y="2162051"/>
-            <a:ext cx="6086324" cy="1566075"/>
+            <a:off x="3842188" y="3840600"/>
+            <a:ext cx="2196450" cy="914250"/>
           </a:xfrm>
           <a:prstGeom prst="rect">
             <a:avLst/>
@@ -16149,6 +16229,128 @@
           </a:ln>
         </p:spPr>
       </p:pic>
+      <p:pic>
+        <p:nvPicPr>
+          <p:cNvPr id="104" name="Google Shape;104;p15"/>
+          <p:cNvPicPr preferRelativeResize="0"/>
+          <p:nvPr/>
+        </p:nvPicPr>
+        <p:blipFill rotWithShape="1">
+          <a:blip r:embed="rId4">
+            <a:alphaModFix/>
+          </a:blip>
+          <a:srcRect b="28062" l="0" r="0" t="27520"/>
+          <a:stretch/>
+        </p:blipFill>
+        <p:spPr>
+          <a:xfrm>
+            <a:off x="1001050" y="3436675"/>
+            <a:ext cx="2409901" cy="535200"/>
+          </a:xfrm>
+          <a:prstGeom prst="rect">
+            <a:avLst/>
+          </a:prstGeom>
+          <a:noFill/>
+          <a:ln>
+            <a:noFill/>
+          </a:ln>
+        </p:spPr>
+      </p:pic>
+      <p:pic>
+        <p:nvPicPr>
+          <p:cNvPr id="105" name="Google Shape;105;p15"/>
+          <p:cNvPicPr preferRelativeResize="0"/>
+          <p:nvPr/>
+        </p:nvPicPr>
+        <p:blipFill rotWithShape="1">
+          <a:blip r:embed="rId5">
+            <a:alphaModFix/>
+          </a:blip>
+          <a:srcRect b="30766" l="0" r="0" t="27329"/>
+          <a:stretch/>
+        </p:blipFill>
+        <p:spPr>
+          <a:xfrm>
+            <a:off x="6808350" y="2117525"/>
+            <a:ext cx="1609800" cy="674550"/>
+          </a:xfrm>
+          <a:prstGeom prst="rect">
+            <a:avLst/>
+          </a:prstGeom>
+          <a:noFill/>
+          <a:ln>
+            <a:noFill/>
+          </a:ln>
+        </p:spPr>
+      </p:pic>
+      <p:pic>
+        <p:nvPicPr>
+          <p:cNvPr id="106" name="Google Shape;106;p15"/>
+          <p:cNvPicPr preferRelativeResize="0"/>
+          <p:nvPr/>
+        </p:nvPicPr>
+        <p:blipFill>
+          <a:blip r:embed="rId6">
+            <a:alphaModFix/>
+          </a:blip>
+          <a:stretch>
+            <a:fillRect/>
+          </a:stretch>
+        </p:blipFill>
+        <p:spPr>
+          <a:xfrm>
+            <a:off x="6747475" y="3205000"/>
+            <a:ext cx="1731534" cy="914250"/>
+          </a:xfrm>
+          <a:prstGeom prst="rect">
+            <a:avLst/>
+          </a:prstGeom>
+          <a:noFill/>
+          <a:ln>
+            <a:noFill/>
+          </a:ln>
+        </p:spPr>
+      </p:pic>
+      <p:sp>
+        <p:nvSpPr>
+          <p:cNvPr id="107" name="Google Shape;107;p15"/>
+          <p:cNvSpPr txBox="1"/>
+          <p:nvPr>
+            <p:ph idx="12" type="sldNum"/>
+          </p:nvPr>
+        </p:nvSpPr>
+        <p:spPr>
+          <a:xfrm>
+            <a:off x="8536302" y="4749851"/>
+            <a:ext cx="548700" cy="393600"/>
+          </a:xfrm>
+          <a:prstGeom prst="rect">
+            <a:avLst/>
+          </a:prstGeom>
+        </p:spPr>
+        <p:txBody>
+          <a:bodyPr anchorCtr="0" anchor="ctr" bIns="91425" lIns="91425" spcFirstLastPara="1" rIns="91425" wrap="square" tIns="91425">
+            <a:normAutofit/>
+          </a:bodyPr>
+          <a:lstStyle/>
+          <a:p>
+            <a:pPr indent="0" lvl="0" marL="0" rtl="0" algn="r">
+              <a:spcBef>
+                <a:spcPts val="0"/>
+              </a:spcBef>
+              <a:spcAft>
+                <a:spcPts val="0"/>
+              </a:spcAft>
+              <a:buNone/>
+            </a:pPr>
+            <a:fld id="{00000000-1234-1234-1234-123412341234}" type="slidenum">
+              <a:rPr lang="it"/>
+              <a:t>‹#›</a:t>
+            </a:fld>
+            <a:endParaRPr/>
+          </a:p>
+        </p:txBody>
+      </p:sp>
     </p:spTree>
   </p:cSld>
   <p:clrMapOvr>
@@ -16162,7 +16364,7 @@
   <p:cSld>
     <p:spTree>
       <p:nvGrpSpPr>
-        <p:cNvPr id="316" name="Shape 316"/>
+        <p:cNvPr id="318" name="Shape 318"/>
         <p:cNvGrpSpPr/>
         <p:nvPr/>
       </p:nvGrpSpPr>
@@ -16176,7 +16378,7 @@
       </p:grpSpPr>
       <p:sp>
         <p:nvSpPr>
-          <p:cNvPr id="317" name="Google Shape;317;p42"/>
+          <p:cNvPr id="319" name="Google Shape;319;p42"/>
           <p:cNvSpPr txBox="1"/>
           <p:nvPr>
             <p:ph type="title"/>
@@ -16216,7 +16418,7 @@
       </p:sp>
       <p:sp>
         <p:nvSpPr>
-          <p:cNvPr id="318" name="Google Shape;318;p42"/>
+          <p:cNvPr id="320" name="Google Shape;320;p42"/>
           <p:cNvSpPr txBox="1"/>
           <p:nvPr>
             <p:ph idx="1" type="body"/>
@@ -16303,7 +16505,7 @@
       </p:sp>
       <p:sp>
         <p:nvSpPr>
-          <p:cNvPr id="319" name="Google Shape;319;p42"/>
+          <p:cNvPr id="321" name="Google Shape;321;p42"/>
           <p:cNvSpPr txBox="1"/>
           <p:nvPr>
             <p:ph idx="12" type="sldNum"/>
@@ -16343,7 +16545,7 @@
       </p:sp>
       <p:pic>
         <p:nvPicPr>
-          <p:cNvPr id="320" name="Google Shape;320;p42"/>
+          <p:cNvPr id="322" name="Google Shape;322;p42"/>
           <p:cNvPicPr preferRelativeResize="0"/>
           <p:nvPr/>
         </p:nvPicPr>
@@ -16371,7 +16573,7 @@
       </p:pic>
       <p:cxnSp>
         <p:nvCxnSpPr>
-          <p:cNvPr id="321" name="Google Shape;321;p42"/>
+          <p:cNvPr id="323" name="Google Shape;323;p42"/>
           <p:cNvCxnSpPr/>
           <p:nvPr/>
         </p:nvCxnSpPr>
@@ -16408,7 +16610,7 @@
   <p:cSld>
     <p:spTree>
       <p:nvGrpSpPr>
-        <p:cNvPr id="325" name="Shape 325"/>
+        <p:cNvPr id="327" name="Shape 327"/>
         <p:cNvGrpSpPr/>
         <p:nvPr/>
       </p:nvGrpSpPr>
@@ -16422,7 +16624,7 @@
       </p:grpSpPr>
       <p:sp>
         <p:nvSpPr>
-          <p:cNvPr id="326" name="Google Shape;326;p43"/>
+          <p:cNvPr id="328" name="Google Shape;328;p43"/>
           <p:cNvSpPr txBox="1"/>
           <p:nvPr>
             <p:ph type="title"/>
@@ -16462,7 +16664,7 @@
       </p:sp>
       <p:sp>
         <p:nvSpPr>
-          <p:cNvPr id="327" name="Google Shape;327;p43"/>
+          <p:cNvPr id="329" name="Google Shape;329;p43"/>
           <p:cNvSpPr txBox="1"/>
           <p:nvPr>
             <p:ph idx="1" type="body"/>
@@ -16503,7 +16705,7 @@
       </p:sp>
       <p:sp>
         <p:nvSpPr>
-          <p:cNvPr id="328" name="Google Shape;328;p43"/>
+          <p:cNvPr id="330" name="Google Shape;330;p43"/>
           <p:cNvSpPr txBox="1"/>
           <p:nvPr>
             <p:ph idx="12" type="sldNum"/>
@@ -16543,7 +16745,7 @@
       </p:sp>
       <p:pic>
         <p:nvPicPr>
-          <p:cNvPr id="329" name="Google Shape;329;p43"/>
+          <p:cNvPr id="331" name="Google Shape;331;p43"/>
           <p:cNvPicPr preferRelativeResize="0"/>
           <p:nvPr/>
         </p:nvPicPr>
@@ -16571,7 +16773,7 @@
       </p:pic>
       <p:sp>
         <p:nvSpPr>
-          <p:cNvPr id="330" name="Google Shape;330;p43"/>
+          <p:cNvPr id="332" name="Google Shape;332;p43"/>
           <p:cNvSpPr txBox="1"/>
           <p:nvPr>
             <p:ph idx="1" type="body"/>
@@ -16639,7 +16841,7 @@
   <p:cSld>
     <p:spTree>
       <p:nvGrpSpPr>
-        <p:cNvPr id="334" name="Shape 334"/>
+        <p:cNvPr id="336" name="Shape 336"/>
         <p:cNvGrpSpPr/>
         <p:nvPr/>
       </p:nvGrpSpPr>
@@ -16653,7 +16855,7 @@
       </p:grpSpPr>
       <p:sp>
         <p:nvSpPr>
-          <p:cNvPr id="335" name="Google Shape;335;p44"/>
+          <p:cNvPr id="337" name="Google Shape;337;p44"/>
           <p:cNvSpPr txBox="1"/>
           <p:nvPr>
             <p:ph idx="1" type="body"/>
@@ -16793,7 +16995,7 @@
       </p:sp>
       <p:sp>
         <p:nvSpPr>
-          <p:cNvPr id="336" name="Google Shape;336;p44"/>
+          <p:cNvPr id="338" name="Google Shape;338;p44"/>
           <p:cNvSpPr txBox="1"/>
           <p:nvPr>
             <p:ph type="title"/>
@@ -16833,7 +17035,7 @@
       </p:sp>
       <p:sp>
         <p:nvSpPr>
-          <p:cNvPr id="337" name="Google Shape;337;p44"/>
+          <p:cNvPr id="339" name="Google Shape;339;p44"/>
           <p:cNvSpPr txBox="1"/>
           <p:nvPr>
             <p:ph idx="12" type="sldNum"/>
@@ -16873,7 +17075,7 @@
       </p:sp>
       <p:pic>
         <p:nvPicPr>
-          <p:cNvPr id="338" name="Google Shape;338;p44"/>
+          <p:cNvPr id="340" name="Google Shape;340;p44"/>
           <p:cNvPicPr preferRelativeResize="0"/>
           <p:nvPr/>
         </p:nvPicPr>
@@ -16912,7 +17114,7 @@
   <p:cSld>
     <p:spTree>
       <p:nvGrpSpPr>
-        <p:cNvPr id="342" name="Shape 342"/>
+        <p:cNvPr id="344" name="Shape 344"/>
         <p:cNvGrpSpPr/>
         <p:nvPr/>
       </p:nvGrpSpPr>
@@ -16926,7 +17128,7 @@
       </p:grpSpPr>
       <p:sp>
         <p:nvSpPr>
-          <p:cNvPr id="343" name="Google Shape;343;p45"/>
+          <p:cNvPr id="345" name="Google Shape;345;p45"/>
           <p:cNvSpPr txBox="1"/>
           <p:nvPr>
             <p:ph idx="1" type="body"/>
@@ -16967,7 +17169,7 @@
       </p:sp>
       <p:sp>
         <p:nvSpPr>
-          <p:cNvPr id="344" name="Google Shape;344;p45"/>
+          <p:cNvPr id="346" name="Google Shape;346;p45"/>
           <p:cNvSpPr txBox="1"/>
           <p:nvPr>
             <p:ph type="title"/>
@@ -17022,7 +17224,7 @@
       </p:sp>
       <p:sp>
         <p:nvSpPr>
-          <p:cNvPr id="345" name="Google Shape;345;p45"/>
+          <p:cNvPr id="347" name="Google Shape;347;p45"/>
           <p:cNvSpPr txBox="1"/>
           <p:nvPr>
             <p:ph idx="12" type="sldNum"/>
@@ -17062,7 +17264,7 @@
       </p:sp>
       <p:pic>
         <p:nvPicPr>
-          <p:cNvPr id="346" name="Google Shape;346;p45"/>
+          <p:cNvPr id="348" name="Google Shape;348;p45"/>
           <p:cNvPicPr preferRelativeResize="0"/>
           <p:nvPr/>
         </p:nvPicPr>
@@ -17090,7 +17292,7 @@
       </p:pic>
       <p:sp>
         <p:nvSpPr>
-          <p:cNvPr id="347" name="Google Shape;347;p45"/>
+          <p:cNvPr id="349" name="Google Shape;349;p45"/>
           <p:cNvSpPr txBox="1"/>
           <p:nvPr>
             <p:ph idx="1" type="body"/>
@@ -17188,7 +17390,7 @@
   <p:cSld>
     <p:spTree>
       <p:nvGrpSpPr>
-        <p:cNvPr id="351" name="Shape 351"/>
+        <p:cNvPr id="353" name="Shape 353"/>
         <p:cNvGrpSpPr/>
         <p:nvPr/>
       </p:nvGrpSpPr>
@@ -17202,7 +17404,7 @@
       </p:grpSpPr>
       <p:sp>
         <p:nvSpPr>
-          <p:cNvPr id="352" name="Google Shape;352;p46"/>
+          <p:cNvPr id="354" name="Google Shape;354;p46"/>
           <p:cNvSpPr txBox="1"/>
           <p:nvPr>
             <p:ph idx="1" type="body"/>
@@ -17276,7 +17478,7 @@
       </p:sp>
       <p:sp>
         <p:nvSpPr>
-          <p:cNvPr id="353" name="Google Shape;353;p46"/>
+          <p:cNvPr id="355" name="Google Shape;355;p46"/>
           <p:cNvSpPr txBox="1"/>
           <p:nvPr>
             <p:ph type="title"/>
@@ -17331,7 +17533,7 @@
       </p:sp>
       <p:sp>
         <p:nvSpPr>
-          <p:cNvPr id="354" name="Google Shape;354;p46"/>
+          <p:cNvPr id="356" name="Google Shape;356;p46"/>
           <p:cNvSpPr txBox="1"/>
           <p:nvPr>
             <p:ph idx="12" type="sldNum"/>
@@ -17371,7 +17573,7 @@
       </p:sp>
       <p:pic>
         <p:nvPicPr>
-          <p:cNvPr id="355" name="Google Shape;355;p46"/>
+          <p:cNvPr id="357" name="Google Shape;357;p46"/>
           <p:cNvPicPr preferRelativeResize="0"/>
           <p:nvPr/>
         </p:nvPicPr>
@@ -17398,7 +17600,7 @@
       </p:pic>
       <p:cxnSp>
         <p:nvCxnSpPr>
-          <p:cNvPr id="356" name="Google Shape;356;p46"/>
+          <p:cNvPr id="358" name="Google Shape;358;p46"/>
           <p:cNvCxnSpPr/>
           <p:nvPr/>
         </p:nvCxnSpPr>
@@ -17435,7 +17637,7 @@
   <p:cSld>
     <p:spTree>
       <p:nvGrpSpPr>
-        <p:cNvPr id="360" name="Shape 360"/>
+        <p:cNvPr id="362" name="Shape 362"/>
         <p:cNvGrpSpPr/>
         <p:nvPr/>
       </p:nvGrpSpPr>
@@ -17449,7 +17651,7 @@
       </p:grpSpPr>
       <p:sp>
         <p:nvSpPr>
-          <p:cNvPr id="361" name="Google Shape;361;p47"/>
+          <p:cNvPr id="363" name="Google Shape;363;p47"/>
           <p:cNvSpPr txBox="1"/>
           <p:nvPr>
             <p:ph idx="1" type="body"/>
@@ -17515,7 +17717,7 @@
       </p:sp>
       <p:sp>
         <p:nvSpPr>
-          <p:cNvPr id="362" name="Google Shape;362;p47"/>
+          <p:cNvPr id="364" name="Google Shape;364;p47"/>
           <p:cNvSpPr txBox="1"/>
           <p:nvPr>
             <p:ph type="title"/>
@@ -17570,7 +17772,7 @@
       </p:sp>
       <p:sp>
         <p:nvSpPr>
-          <p:cNvPr id="363" name="Google Shape;363;p47"/>
+          <p:cNvPr id="365" name="Google Shape;365;p47"/>
           <p:cNvSpPr txBox="1"/>
           <p:nvPr>
             <p:ph idx="12" type="sldNum"/>
@@ -17610,7 +17812,7 @@
       </p:sp>
       <p:pic>
         <p:nvPicPr>
-          <p:cNvPr id="364" name="Google Shape;364;p47"/>
+          <p:cNvPr id="366" name="Google Shape;366;p47"/>
           <p:cNvPicPr preferRelativeResize="0"/>
           <p:nvPr/>
         </p:nvPicPr>
@@ -17638,7 +17840,7 @@
       </p:pic>
       <p:pic>
         <p:nvPicPr>
-          <p:cNvPr id="365" name="Google Shape;365;p47"/>
+          <p:cNvPr id="367" name="Google Shape;367;p47"/>
           <p:cNvPicPr preferRelativeResize="0"/>
           <p:nvPr/>
         </p:nvPicPr>
@@ -17677,7 +17879,7 @@
   <p:cSld>
     <p:spTree>
       <p:nvGrpSpPr>
-        <p:cNvPr id="369" name="Shape 369"/>
+        <p:cNvPr id="371" name="Shape 371"/>
         <p:cNvGrpSpPr/>
         <p:nvPr/>
       </p:nvGrpSpPr>
@@ -17691,7 +17893,7 @@
       </p:grpSpPr>
       <p:sp>
         <p:nvSpPr>
-          <p:cNvPr id="370" name="Google Shape;370;p48"/>
+          <p:cNvPr id="372" name="Google Shape;372;p48"/>
           <p:cNvSpPr txBox="1"/>
           <p:nvPr>
             <p:ph idx="1" type="body"/>
@@ -17774,7 +17976,7 @@
       </p:sp>
       <p:sp>
         <p:nvSpPr>
-          <p:cNvPr id="371" name="Google Shape;371;p48"/>
+          <p:cNvPr id="373" name="Google Shape;373;p48"/>
           <p:cNvSpPr txBox="1"/>
           <p:nvPr>
             <p:ph type="title"/>
@@ -17829,7 +18031,7 @@
       </p:sp>
       <p:sp>
         <p:nvSpPr>
-          <p:cNvPr id="372" name="Google Shape;372;p48"/>
+          <p:cNvPr id="374" name="Google Shape;374;p48"/>
           <p:cNvSpPr txBox="1"/>
           <p:nvPr>
             <p:ph idx="12" type="sldNum"/>
@@ -17869,7 +18071,7 @@
       </p:sp>
       <p:pic>
         <p:nvPicPr>
-          <p:cNvPr id="373" name="Google Shape;373;p48"/>
+          <p:cNvPr id="375" name="Google Shape;375;p48"/>
           <p:cNvPicPr preferRelativeResize="0"/>
           <p:nvPr/>
         </p:nvPicPr>
@@ -17897,7 +18099,7 @@
       </p:pic>
       <p:pic>
         <p:nvPicPr>
-          <p:cNvPr id="374" name="Google Shape;374;p48"/>
+          <p:cNvPr id="376" name="Google Shape;376;p48"/>
           <p:cNvPicPr preferRelativeResize="0"/>
           <p:nvPr/>
         </p:nvPicPr>
@@ -17925,7 +18127,7 @@
       </p:pic>
       <p:cxnSp>
         <p:nvCxnSpPr>
-          <p:cNvPr id="375" name="Google Shape;375;p48"/>
+          <p:cNvPr id="377" name="Google Shape;377;p48"/>
           <p:cNvCxnSpPr/>
           <p:nvPr/>
         </p:nvCxnSpPr>
@@ -17951,7 +18153,7 @@
       </p:cxnSp>
       <p:cxnSp>
         <p:nvCxnSpPr>
-          <p:cNvPr id="376" name="Google Shape;376;p48"/>
+          <p:cNvPr id="378" name="Google Shape;378;p48"/>
           <p:cNvCxnSpPr/>
           <p:nvPr/>
         </p:nvCxnSpPr>
@@ -17988,7 +18190,7 @@
   <p:cSld>
     <p:spTree>
       <p:nvGrpSpPr>
-        <p:cNvPr id="380" name="Shape 380"/>
+        <p:cNvPr id="382" name="Shape 382"/>
         <p:cNvGrpSpPr/>
         <p:nvPr/>
       </p:nvGrpSpPr>
@@ -18002,7 +18204,7 @@
       </p:grpSpPr>
       <p:sp>
         <p:nvSpPr>
-          <p:cNvPr id="381" name="Google Shape;381;p49"/>
+          <p:cNvPr id="383" name="Google Shape;383;p49"/>
           <p:cNvSpPr txBox="1"/>
           <p:nvPr>
             <p:ph type="title"/>
@@ -18058,7 +18260,7 @@
       </p:sp>
       <p:sp>
         <p:nvSpPr>
-          <p:cNvPr id="382" name="Google Shape;382;p49"/>
+          <p:cNvPr id="384" name="Google Shape;384;p49"/>
           <p:cNvSpPr txBox="1"/>
           <p:nvPr>
             <p:ph idx="12" type="sldNum"/>
@@ -18109,7 +18311,7 @@
   <p:cSld>
     <p:spTree>
       <p:nvGrpSpPr>
-        <p:cNvPr id="386" name="Shape 386"/>
+        <p:cNvPr id="388" name="Shape 388"/>
         <p:cNvGrpSpPr/>
         <p:nvPr/>
       </p:nvGrpSpPr>
@@ -18123,7 +18325,7 @@
       </p:grpSpPr>
       <p:sp>
         <p:nvSpPr>
-          <p:cNvPr id="387" name="Google Shape;387;p50"/>
+          <p:cNvPr id="389" name="Google Shape;389;p50"/>
           <p:cNvSpPr txBox="1"/>
           <p:nvPr>
             <p:ph type="title"/>
@@ -18163,7 +18365,7 @@
       </p:sp>
       <p:sp>
         <p:nvSpPr>
-          <p:cNvPr id="388" name="Google Shape;388;p50"/>
+          <p:cNvPr id="390" name="Google Shape;390;p50"/>
           <p:cNvSpPr txBox="1"/>
           <p:nvPr>
             <p:ph idx="1" type="body"/>
@@ -18245,7 +18447,7 @@
       </p:sp>
       <p:sp>
         <p:nvSpPr>
-          <p:cNvPr id="389" name="Google Shape;389;p50"/>
+          <p:cNvPr id="391" name="Google Shape;391;p50"/>
           <p:cNvSpPr txBox="1"/>
           <p:nvPr>
             <p:ph idx="12" type="sldNum"/>
@@ -18285,7 +18487,7 @@
       </p:sp>
       <p:pic>
         <p:nvPicPr>
-          <p:cNvPr id="390" name="Google Shape;390;p50"/>
+          <p:cNvPr id="392" name="Google Shape;392;p50"/>
           <p:cNvPicPr preferRelativeResize="0"/>
           <p:nvPr/>
         </p:nvPicPr>
@@ -18312,7 +18514,7 @@
       </p:pic>
       <p:pic>
         <p:nvPicPr>
-          <p:cNvPr id="391" name="Google Shape;391;p50"/>
+          <p:cNvPr id="393" name="Google Shape;393;p50"/>
           <p:cNvPicPr preferRelativeResize="0"/>
           <p:nvPr/>
         </p:nvPicPr>
@@ -18351,7 +18553,7 @@
   <p:cSld>
     <p:spTree>
       <p:nvGrpSpPr>
-        <p:cNvPr id="395" name="Shape 395"/>
+        <p:cNvPr id="397" name="Shape 397"/>
         <p:cNvGrpSpPr/>
         <p:nvPr/>
       </p:nvGrpSpPr>
@@ -18365,7 +18567,7 @@
       </p:grpSpPr>
       <p:sp>
         <p:nvSpPr>
-          <p:cNvPr id="396" name="Google Shape;396;p51"/>
+          <p:cNvPr id="398" name="Google Shape;398;p51"/>
           <p:cNvSpPr txBox="1"/>
           <p:nvPr>
             <p:ph type="title"/>
@@ -18405,7 +18607,7 @@
       </p:sp>
       <p:sp>
         <p:nvSpPr>
-          <p:cNvPr id="397" name="Google Shape;397;p51"/>
+          <p:cNvPr id="399" name="Google Shape;399;p51"/>
           <p:cNvSpPr txBox="1"/>
           <p:nvPr>
             <p:ph idx="1" type="body"/>
@@ -18479,7 +18681,7 @@
       </p:sp>
       <p:sp>
         <p:nvSpPr>
-          <p:cNvPr id="398" name="Google Shape;398;p51"/>
+          <p:cNvPr id="400" name="Google Shape;400;p51"/>
           <p:cNvSpPr txBox="1"/>
           <p:nvPr>
             <p:ph idx="12" type="sldNum"/>
@@ -18519,7 +18721,7 @@
       </p:sp>
       <p:pic>
         <p:nvPicPr>
-          <p:cNvPr id="399" name="Google Shape;399;p51"/>
+          <p:cNvPr id="401" name="Google Shape;401;p51"/>
           <p:cNvPicPr preferRelativeResize="0"/>
           <p:nvPr/>
         </p:nvPicPr>
@@ -18558,7 +18760,7 @@
   <p:cSld>
     <p:spTree>
       <p:nvGrpSpPr>
-        <p:cNvPr id="109" name="Shape 109"/>
+        <p:cNvPr id="111" name="Shape 111"/>
         <p:cNvGrpSpPr/>
         <p:nvPr/>
       </p:nvGrpSpPr>
@@ -18572,7 +18774,7 @@
       </p:grpSpPr>
       <p:sp>
         <p:nvSpPr>
-          <p:cNvPr id="110" name="Google Shape;110;p16"/>
+          <p:cNvPr id="112" name="Google Shape;112;p16"/>
           <p:cNvSpPr txBox="1"/>
           <p:nvPr>
             <p:ph type="title"/>
@@ -18605,7 +18807,7 @@
             </a:pPr>
             <a:r>
               <a:rPr lang="it" sz="2840"/>
-              <a:t>Roadmap</a:t>
+              <a:t>Spiking Neural Network Simulators</a:t>
             </a:r>
             <a:endParaRPr sz="2840"/>
           </a:p>
@@ -18613,150 +18815,7 @@
       </p:sp>
       <p:sp>
         <p:nvSpPr>
-          <p:cNvPr id="111" name="Google Shape;111;p16"/>
-          <p:cNvSpPr txBox="1"/>
-          <p:nvPr>
-            <p:ph idx="1" type="body"/>
-          </p:nvPr>
-        </p:nvSpPr>
-        <p:spPr>
-          <a:xfrm>
-            <a:off x="729450" y="2078875"/>
-            <a:ext cx="7688700" cy="2261100"/>
-          </a:xfrm>
-          <a:prstGeom prst="rect">
-            <a:avLst/>
-          </a:prstGeom>
-        </p:spPr>
-        <p:txBody>
-          <a:bodyPr anchorCtr="0" anchor="t" bIns="91425" lIns="91425" spcFirstLastPara="1" rIns="91425" wrap="square" tIns="91425">
-            <a:normAutofit/>
-          </a:bodyPr>
-          <a:lstStyle/>
-          <a:p>
-            <a:pPr indent="-330200" lvl="0" marL="457200" rtl="0" algn="just">
-              <a:spcBef>
-                <a:spcPts val="0"/>
-              </a:spcBef>
-              <a:spcAft>
-                <a:spcPts val="0"/>
-              </a:spcAft>
-              <a:buSzPts val="1600"/>
-              <a:buChar char="●"/>
-            </a:pPr>
-            <a:r>
-              <a:rPr lang="it"/>
-              <a:t>Installazione snnTorch;</a:t>
-            </a:r>
-            <a:endParaRPr/>
-          </a:p>
-          <a:p>
-            <a:pPr indent="-330200" lvl="0" marL="457200" rtl="0" algn="just">
-              <a:spcBef>
-                <a:spcPts val="0"/>
-              </a:spcBef>
-              <a:spcAft>
-                <a:spcPts val="0"/>
-              </a:spcAft>
-              <a:buSzPts val="1600"/>
-              <a:buChar char="●"/>
-            </a:pPr>
-            <a:r>
-              <a:rPr lang="it"/>
-              <a:t>Creare un neurone (caratteristiche e parametri);</a:t>
-            </a:r>
-            <a:endParaRPr/>
-          </a:p>
-          <a:p>
-            <a:pPr indent="-330200" lvl="0" marL="457200" rtl="0" algn="just">
-              <a:spcBef>
-                <a:spcPts val="0"/>
-              </a:spcBef>
-              <a:spcAft>
-                <a:spcPts val="0"/>
-              </a:spcAft>
-              <a:buSzPts val="1600"/>
-              <a:buChar char="●"/>
-            </a:pPr>
-            <a:r>
-              <a:rPr lang="it"/>
-              <a:t>Creare ed allenare una rete;</a:t>
-            </a:r>
-            <a:endParaRPr/>
-          </a:p>
-          <a:p>
-            <a:pPr indent="-330200" lvl="0" marL="457200" rtl="0" algn="just">
-              <a:spcBef>
-                <a:spcPts val="0"/>
-              </a:spcBef>
-              <a:spcAft>
-                <a:spcPts val="0"/>
-              </a:spcAft>
-              <a:buSzPts val="1600"/>
-              <a:buChar char="●"/>
-            </a:pPr>
-            <a:r>
-              <a:rPr lang="it"/>
-              <a:t>Classificazione su MNIST;</a:t>
-            </a:r>
-            <a:endParaRPr/>
-          </a:p>
-          <a:p>
-            <a:pPr indent="-330200" lvl="0" marL="457200" rtl="0" algn="just">
-              <a:spcBef>
-                <a:spcPts val="0"/>
-              </a:spcBef>
-              <a:spcAft>
-                <a:spcPts val="0"/>
-              </a:spcAft>
-              <a:buSzPts val="1600"/>
-              <a:buChar char="●"/>
-            </a:pPr>
-            <a:r>
-              <a:rPr lang="it"/>
-              <a:t>Riconoscimento pattern temporali;</a:t>
-            </a:r>
-            <a:endParaRPr/>
-          </a:p>
-          <a:p>
-            <a:pPr indent="-330200" lvl="0" marL="457200" rtl="0" algn="just">
-              <a:spcBef>
-                <a:spcPts val="0"/>
-              </a:spcBef>
-              <a:spcAft>
-                <a:spcPts val="0"/>
-              </a:spcAft>
-              <a:buSzPts val="1600"/>
-              <a:buChar char="●"/>
-            </a:pPr>
-            <a:r>
-              <a:rPr lang="it"/>
-              <a:t>Anomaly Detection;</a:t>
-            </a:r>
-            <a:endParaRPr/>
-          </a:p>
-          <a:p>
-            <a:pPr indent="-330200" lvl="0" marL="457200" rtl="0" algn="just">
-              <a:spcBef>
-                <a:spcPts val="0"/>
-              </a:spcBef>
-              <a:spcAft>
-                <a:spcPts val="0"/>
-              </a:spcAft>
-              <a:buSzPts val="1600"/>
-              <a:buChar char="●"/>
-            </a:pPr>
-            <a:r>
-              <a:rPr lang="it"/>
-              <a:t>Online Learning con Robot.</a:t>
-            </a:r>
-            <a:endParaRPr/>
-          </a:p>
-        </p:txBody>
-      </p:sp>
-      <p:sp>
-        <p:nvSpPr>
-          <p:cNvPr id="112" name="Google Shape;112;p16"/>
+          <p:cNvPr id="113" name="Google Shape;113;p16"/>
           <p:cNvSpPr txBox="1"/>
           <p:nvPr>
             <p:ph idx="12" type="sldNum"/>
@@ -18794,6 +18853,34 @@
           </a:p>
         </p:txBody>
       </p:sp>
+      <p:pic>
+        <p:nvPicPr>
+          <p:cNvPr id="114" name="Google Shape;114;p16"/>
+          <p:cNvPicPr preferRelativeResize="0"/>
+          <p:nvPr/>
+        </p:nvPicPr>
+        <p:blipFill>
+          <a:blip r:embed="rId3">
+            <a:alphaModFix/>
+          </a:blip>
+          <a:stretch>
+            <a:fillRect/>
+          </a:stretch>
+        </p:blipFill>
+        <p:spPr>
+          <a:xfrm>
+            <a:off x="729450" y="2162051"/>
+            <a:ext cx="6086324" cy="1566075"/>
+          </a:xfrm>
+          <a:prstGeom prst="rect">
+            <a:avLst/>
+          </a:prstGeom>
+          <a:noFill/>
+          <a:ln>
+            <a:noFill/>
+          </a:ln>
+        </p:spPr>
+      </p:pic>
     </p:spTree>
   </p:cSld>
   <p:clrMapOvr>
@@ -18807,7 +18894,7 @@
   <p:cSld>
     <p:spTree>
       <p:nvGrpSpPr>
-        <p:cNvPr id="403" name="Shape 403"/>
+        <p:cNvPr id="405" name="Shape 405"/>
         <p:cNvGrpSpPr/>
         <p:nvPr/>
       </p:nvGrpSpPr>
@@ -18821,7 +18908,7 @@
       </p:grpSpPr>
       <p:sp>
         <p:nvSpPr>
-          <p:cNvPr id="404" name="Google Shape;404;p52"/>
+          <p:cNvPr id="406" name="Google Shape;406;p52"/>
           <p:cNvSpPr txBox="1"/>
           <p:nvPr>
             <p:ph type="title"/>
@@ -18861,7 +18948,7 @@
       </p:sp>
       <p:sp>
         <p:nvSpPr>
-          <p:cNvPr id="405" name="Google Shape;405;p52"/>
+          <p:cNvPr id="407" name="Google Shape;407;p52"/>
           <p:cNvSpPr txBox="1"/>
           <p:nvPr>
             <p:ph idx="1" type="body"/>
@@ -18965,7 +19052,7 @@
       </p:sp>
       <p:sp>
         <p:nvSpPr>
-          <p:cNvPr id="406" name="Google Shape;406;p52"/>
+          <p:cNvPr id="408" name="Google Shape;408;p52"/>
           <p:cNvSpPr txBox="1"/>
           <p:nvPr>
             <p:ph idx="12" type="sldNum"/>
@@ -19005,7 +19092,7 @@
       </p:sp>
       <p:pic>
         <p:nvPicPr>
-          <p:cNvPr id="407" name="Google Shape;407;p52"/>
+          <p:cNvPr id="409" name="Google Shape;409;p52"/>
           <p:cNvPicPr preferRelativeResize="0"/>
           <p:nvPr/>
         </p:nvPicPr>
@@ -19033,7 +19120,7 @@
       </p:pic>
       <p:pic>
         <p:nvPicPr>
-          <p:cNvPr id="408" name="Google Shape;408;p52"/>
+          <p:cNvPr id="410" name="Google Shape;410;p52"/>
           <p:cNvPicPr preferRelativeResize="0"/>
           <p:nvPr/>
         </p:nvPicPr>
@@ -19061,7 +19148,7 @@
       </p:pic>
       <p:cxnSp>
         <p:nvCxnSpPr>
-          <p:cNvPr id="409" name="Google Shape;409;p52"/>
+          <p:cNvPr id="411" name="Google Shape;411;p52"/>
           <p:cNvCxnSpPr/>
           <p:nvPr/>
         </p:nvCxnSpPr>
@@ -19087,7 +19174,7 @@
       </p:cxnSp>
       <p:cxnSp>
         <p:nvCxnSpPr>
-          <p:cNvPr id="410" name="Google Shape;410;p52"/>
+          <p:cNvPr id="412" name="Google Shape;412;p52"/>
           <p:cNvCxnSpPr/>
           <p:nvPr/>
         </p:nvCxnSpPr>
@@ -19124,7 +19211,7 @@
   <p:cSld>
     <p:spTree>
       <p:nvGrpSpPr>
-        <p:cNvPr id="414" name="Shape 414"/>
+        <p:cNvPr id="416" name="Shape 416"/>
         <p:cNvGrpSpPr/>
         <p:nvPr/>
       </p:nvGrpSpPr>
@@ -19138,7 +19225,7 @@
       </p:grpSpPr>
       <p:sp>
         <p:nvSpPr>
-          <p:cNvPr id="415" name="Google Shape;415;p53"/>
+          <p:cNvPr id="417" name="Google Shape;417;p53"/>
           <p:cNvSpPr txBox="1"/>
           <p:nvPr>
             <p:ph type="title"/>
@@ -19178,7 +19265,7 @@
       </p:sp>
       <p:sp>
         <p:nvSpPr>
-          <p:cNvPr id="416" name="Google Shape;416;p53"/>
+          <p:cNvPr id="418" name="Google Shape;418;p53"/>
           <p:cNvSpPr txBox="1"/>
           <p:nvPr>
             <p:ph idx="1" type="body"/>
@@ -19277,7 +19364,7 @@
       </p:sp>
       <p:sp>
         <p:nvSpPr>
-          <p:cNvPr id="417" name="Google Shape;417;p53"/>
+          <p:cNvPr id="419" name="Google Shape;419;p53"/>
           <p:cNvSpPr txBox="1"/>
           <p:nvPr>
             <p:ph idx="12" type="sldNum"/>
@@ -19317,7 +19404,7 @@
       </p:sp>
       <p:pic>
         <p:nvPicPr>
-          <p:cNvPr id="418" name="Google Shape;418;p53"/>
+          <p:cNvPr id="420" name="Google Shape;420;p53"/>
           <p:cNvPicPr preferRelativeResize="0"/>
           <p:nvPr/>
         </p:nvPicPr>
@@ -19345,7 +19432,7 @@
       </p:pic>
       <p:pic>
         <p:nvPicPr>
-          <p:cNvPr id="419" name="Google Shape;419;p53"/>
+          <p:cNvPr id="421" name="Google Shape;421;p53"/>
           <p:cNvPicPr preferRelativeResize="0"/>
           <p:nvPr/>
         </p:nvPicPr>
@@ -19373,9 +19460,9 @@
       </p:pic>
       <p:cxnSp>
         <p:nvCxnSpPr>
-          <p:cNvPr id="420" name="Google Shape;420;p53"/>
+          <p:cNvPr id="422" name="Google Shape;422;p53"/>
           <p:cNvCxnSpPr>
-            <a:endCxn id="418" idx="1"/>
+            <a:endCxn id="420" idx="1"/>
           </p:cNvCxnSpPr>
           <p:nvPr/>
         </p:nvCxnSpPr>
@@ -19401,9 +19488,9 @@
       </p:cxnSp>
       <p:cxnSp>
         <p:nvCxnSpPr>
-          <p:cNvPr id="421" name="Google Shape;421;p53"/>
+          <p:cNvPr id="423" name="Google Shape;423;p53"/>
           <p:cNvCxnSpPr>
-            <a:endCxn id="419" idx="1"/>
+            <a:endCxn id="421" idx="1"/>
           </p:cNvCxnSpPr>
           <p:nvPr/>
         </p:nvCxnSpPr>
@@ -19429,7 +19516,7 @@
       </p:cxnSp>
       <p:pic>
         <p:nvPicPr>
-          <p:cNvPr id="422" name="Google Shape;422;p53"/>
+          <p:cNvPr id="424" name="Google Shape;424;p53"/>
           <p:cNvPicPr preferRelativeResize="0"/>
           <p:nvPr/>
         </p:nvPicPr>
@@ -19468,7 +19555,7 @@
   <p:cSld>
     <p:spTree>
       <p:nvGrpSpPr>
-        <p:cNvPr id="426" name="Shape 426"/>
+        <p:cNvPr id="428" name="Shape 428"/>
         <p:cNvGrpSpPr/>
         <p:nvPr/>
       </p:nvGrpSpPr>
@@ -19482,7 +19569,7 @@
       </p:grpSpPr>
       <p:sp>
         <p:nvSpPr>
-          <p:cNvPr id="427" name="Google Shape;427;p54"/>
+          <p:cNvPr id="429" name="Google Shape;429;p54"/>
           <p:cNvSpPr txBox="1"/>
           <p:nvPr>
             <p:ph type="title"/>
@@ -19522,7 +19609,7 @@
       </p:sp>
       <p:sp>
         <p:nvSpPr>
-          <p:cNvPr id="428" name="Google Shape;428;p54"/>
+          <p:cNvPr id="430" name="Google Shape;430;p54"/>
           <p:cNvSpPr txBox="1"/>
           <p:nvPr>
             <p:ph idx="1" type="body"/>
@@ -19604,7 +19691,7 @@
       </p:sp>
       <p:sp>
         <p:nvSpPr>
-          <p:cNvPr id="429" name="Google Shape;429;p54"/>
+          <p:cNvPr id="431" name="Google Shape;431;p54"/>
           <p:cNvSpPr txBox="1"/>
           <p:nvPr>
             <p:ph idx="12" type="sldNum"/>
@@ -19644,7 +19731,7 @@
       </p:sp>
       <p:cxnSp>
         <p:nvCxnSpPr>
-          <p:cNvPr id="430" name="Google Shape;430;p54"/>
+          <p:cNvPr id="432" name="Google Shape;432;p54"/>
           <p:cNvCxnSpPr/>
           <p:nvPr/>
         </p:nvCxnSpPr>
@@ -19670,7 +19757,7 @@
       </p:cxnSp>
       <p:pic>
         <p:nvPicPr>
-          <p:cNvPr id="431" name="Google Shape;431;p54"/>
+          <p:cNvPr id="433" name="Google Shape;433;p54"/>
           <p:cNvPicPr preferRelativeResize="0"/>
           <p:nvPr/>
         </p:nvPicPr>
@@ -19698,7 +19785,7 @@
       </p:pic>
       <p:pic>
         <p:nvPicPr>
-          <p:cNvPr id="432" name="Google Shape;432;p54"/>
+          <p:cNvPr id="434" name="Google Shape;434;p54"/>
           <p:cNvPicPr preferRelativeResize="0"/>
           <p:nvPr/>
         </p:nvPicPr>
@@ -19726,9 +19813,9 @@
       </p:pic>
       <p:cxnSp>
         <p:nvCxnSpPr>
-          <p:cNvPr id="433" name="Google Shape;433;p54"/>
+          <p:cNvPr id="435" name="Google Shape;435;p54"/>
           <p:cNvCxnSpPr>
-            <a:endCxn id="431" idx="1"/>
+            <a:endCxn id="433" idx="1"/>
           </p:cNvCxnSpPr>
           <p:nvPr/>
         </p:nvCxnSpPr>
@@ -19754,9 +19841,9 @@
       </p:cxnSp>
       <p:cxnSp>
         <p:nvCxnSpPr>
-          <p:cNvPr id="434" name="Google Shape;434;p54"/>
+          <p:cNvPr id="436" name="Google Shape;436;p54"/>
           <p:cNvCxnSpPr>
-            <a:stCxn id="428" idx="3"/>
+            <a:stCxn id="430" idx="3"/>
           </p:cNvCxnSpPr>
           <p:nvPr/>
         </p:nvCxnSpPr>
@@ -19793,7 +19880,7 @@
   <p:cSld>
     <p:spTree>
       <p:nvGrpSpPr>
-        <p:cNvPr id="438" name="Shape 438"/>
+        <p:cNvPr id="440" name="Shape 440"/>
         <p:cNvGrpSpPr/>
         <p:nvPr/>
       </p:nvGrpSpPr>
@@ -19807,7 +19894,7 @@
       </p:grpSpPr>
       <p:sp>
         <p:nvSpPr>
-          <p:cNvPr id="439" name="Google Shape;439;p55"/>
+          <p:cNvPr id="441" name="Google Shape;441;p55"/>
           <p:cNvSpPr txBox="1"/>
           <p:nvPr>
             <p:ph type="title"/>
@@ -19847,7 +19934,7 @@
       </p:sp>
       <p:sp>
         <p:nvSpPr>
-          <p:cNvPr id="440" name="Google Shape;440;p55"/>
+          <p:cNvPr id="442" name="Google Shape;442;p55"/>
           <p:cNvSpPr txBox="1"/>
           <p:nvPr>
             <p:ph idx="1" type="body"/>
@@ -19925,7 +20012,7 @@
       </p:sp>
       <p:sp>
         <p:nvSpPr>
-          <p:cNvPr id="441" name="Google Shape;441;p55"/>
+          <p:cNvPr id="443" name="Google Shape;443;p55"/>
           <p:cNvSpPr txBox="1"/>
           <p:nvPr>
             <p:ph idx="12" type="sldNum"/>
@@ -19965,7 +20052,7 @@
       </p:sp>
       <p:pic>
         <p:nvPicPr>
-          <p:cNvPr id="442" name="Google Shape;442;p55"/>
+          <p:cNvPr id="444" name="Google Shape;444;p55"/>
           <p:cNvPicPr preferRelativeResize="0"/>
           <p:nvPr/>
         </p:nvPicPr>
@@ -20003,7 +20090,7 @@
   <p:cSld>
     <p:spTree>
       <p:nvGrpSpPr>
-        <p:cNvPr id="116" name="Shape 116"/>
+        <p:cNvPr id="118" name="Shape 118"/>
         <p:cNvGrpSpPr/>
         <p:nvPr/>
       </p:nvGrpSpPr>
@@ -20017,7 +20104,7 @@
       </p:grpSpPr>
       <p:sp>
         <p:nvSpPr>
-          <p:cNvPr id="117" name="Google Shape;117;p17"/>
+          <p:cNvPr id="119" name="Google Shape;119;p17"/>
           <p:cNvSpPr txBox="1"/>
           <p:nvPr>
             <p:ph type="title"/>
@@ -20058,7 +20145,7 @@
       </p:sp>
       <p:sp>
         <p:nvSpPr>
-          <p:cNvPr id="118" name="Google Shape;118;p17"/>
+          <p:cNvPr id="120" name="Google Shape;120;p17"/>
           <p:cNvSpPr txBox="1"/>
           <p:nvPr>
             <p:ph idx="1" type="body"/>
@@ -20203,7 +20290,7 @@
       </p:sp>
       <p:pic>
         <p:nvPicPr>
-          <p:cNvPr id="119" name="Google Shape;119;p17"/>
+          <p:cNvPr id="121" name="Google Shape;121;p17"/>
           <p:cNvPicPr preferRelativeResize="0"/>
           <p:nvPr/>
         </p:nvPicPr>
@@ -20230,7 +20317,7 @@
       </p:pic>
       <p:sp>
         <p:nvSpPr>
-          <p:cNvPr id="120" name="Google Shape;120;p17"/>
+          <p:cNvPr id="122" name="Google Shape;122;p17"/>
           <p:cNvSpPr txBox="1"/>
           <p:nvPr>
             <p:ph idx="12" type="sldNum"/>
@@ -20270,7 +20357,7 @@
       </p:sp>
       <p:pic>
         <p:nvPicPr>
-          <p:cNvPr id="121" name="Google Shape;121;p17"/>
+          <p:cNvPr id="123" name="Google Shape;123;p17"/>
           <p:cNvPicPr preferRelativeResize="0"/>
           <p:nvPr/>
         </p:nvPicPr>
@@ -20298,7 +20385,7 @@
       </p:pic>
       <p:pic>
         <p:nvPicPr>
-          <p:cNvPr id="122" name="Google Shape;122;p17"/>
+          <p:cNvPr id="124" name="Google Shape;124;p17"/>
           <p:cNvPicPr preferRelativeResize="0"/>
           <p:nvPr/>
         </p:nvPicPr>
@@ -20336,7 +20423,7 @@
   <p:cSld>
     <p:spTree>
       <p:nvGrpSpPr>
-        <p:cNvPr id="126" name="Shape 126"/>
+        <p:cNvPr id="128" name="Shape 128"/>
         <p:cNvGrpSpPr/>
         <p:nvPr/>
       </p:nvGrpSpPr>
@@ -20350,7 +20437,7 @@
       </p:grpSpPr>
       <p:sp>
         <p:nvSpPr>
-          <p:cNvPr id="127" name="Google Shape;127;p18"/>
+          <p:cNvPr id="129" name="Google Shape;129;p18"/>
           <p:cNvSpPr txBox="1"/>
           <p:nvPr>
             <p:ph type="title"/>
@@ -20406,7 +20493,7 @@
       </p:sp>
       <p:sp>
         <p:nvSpPr>
-          <p:cNvPr id="128" name="Google Shape;128;p18"/>
+          <p:cNvPr id="130" name="Google Shape;130;p18"/>
           <p:cNvSpPr txBox="1"/>
           <p:nvPr>
             <p:ph idx="12" type="sldNum"/>
@@ -20457,7 +20544,7 @@
   <p:cSld>
     <p:spTree>
       <p:nvGrpSpPr>
-        <p:cNvPr id="132" name="Shape 132"/>
+        <p:cNvPr id="134" name="Shape 134"/>
         <p:cNvGrpSpPr/>
         <p:nvPr/>
       </p:nvGrpSpPr>
@@ -20471,7 +20558,7 @@
       </p:grpSpPr>
       <p:sp>
         <p:nvSpPr>
-          <p:cNvPr id="133" name="Google Shape;133;p19"/>
+          <p:cNvPr id="135" name="Google Shape;135;p19"/>
           <p:cNvSpPr txBox="1"/>
           <p:nvPr>
             <p:ph type="title"/>
@@ -20511,7 +20598,7 @@
       </p:sp>
       <p:sp>
         <p:nvSpPr>
-          <p:cNvPr id="134" name="Google Shape;134;p19"/>
+          <p:cNvPr id="136" name="Google Shape;136;p19"/>
           <p:cNvSpPr txBox="1"/>
           <p:nvPr>
             <p:ph idx="1" type="body"/>
@@ -20586,7 +20673,7 @@
       </p:sp>
       <p:sp>
         <p:nvSpPr>
-          <p:cNvPr id="135" name="Google Shape;135;p19"/>
+          <p:cNvPr id="137" name="Google Shape;137;p19"/>
           <p:cNvSpPr txBox="1"/>
           <p:nvPr>
             <p:ph idx="12" type="sldNum"/>
@@ -20637,7 +20724,7 @@
   <p:cSld>
     <p:spTree>
       <p:nvGrpSpPr>
-        <p:cNvPr id="139" name="Shape 139"/>
+        <p:cNvPr id="141" name="Shape 141"/>
         <p:cNvGrpSpPr/>
         <p:nvPr/>
       </p:nvGrpSpPr>
@@ -20651,7 +20738,7 @@
       </p:grpSpPr>
       <p:sp>
         <p:nvSpPr>
-          <p:cNvPr id="140" name="Google Shape;140;p20"/>
+          <p:cNvPr id="142" name="Google Shape;142;p20"/>
           <p:cNvSpPr txBox="1"/>
           <p:nvPr>
             <p:ph type="title"/>
@@ -20691,7 +20778,7 @@
       </p:sp>
       <p:sp>
         <p:nvSpPr>
-          <p:cNvPr id="141" name="Google Shape;141;p20"/>
+          <p:cNvPr id="143" name="Google Shape;143;p20"/>
           <p:cNvSpPr txBox="1"/>
           <p:nvPr>
             <p:ph idx="1" type="body"/>
@@ -20795,7 +20882,7 @@
       </p:sp>
       <p:sp>
         <p:nvSpPr>
-          <p:cNvPr id="142" name="Google Shape;142;p20"/>
+          <p:cNvPr id="144" name="Google Shape;144;p20"/>
           <p:cNvSpPr txBox="1"/>
           <p:nvPr>
             <p:ph idx="12" type="sldNum"/>
@@ -20835,7 +20922,7 @@
       </p:sp>
       <p:pic>
         <p:nvPicPr>
-          <p:cNvPr id="143" name="Google Shape;143;p20"/>
+          <p:cNvPr id="145" name="Google Shape;145;p20"/>
           <p:cNvPicPr preferRelativeResize="0"/>
           <p:nvPr/>
         </p:nvPicPr>
@@ -20873,7 +20960,7 @@
   <p:cSld>
     <p:spTree>
       <p:nvGrpSpPr>
-        <p:cNvPr id="147" name="Shape 147"/>
+        <p:cNvPr id="149" name="Shape 149"/>
         <p:cNvGrpSpPr/>
         <p:nvPr/>
       </p:nvGrpSpPr>
@@ -20887,7 +20974,7 @@
       </p:grpSpPr>
       <p:sp>
         <p:nvSpPr>
-          <p:cNvPr id="148" name="Google Shape;148;p21"/>
+          <p:cNvPr id="150" name="Google Shape;150;p21"/>
           <p:cNvSpPr txBox="1"/>
           <p:nvPr>
             <p:ph type="title"/>
@@ -20927,7 +21014,7 @@
       </p:sp>
       <p:sp>
         <p:nvSpPr>
-          <p:cNvPr id="149" name="Google Shape;149;p21"/>
+          <p:cNvPr id="151" name="Google Shape;151;p21"/>
           <p:cNvSpPr txBox="1"/>
           <p:nvPr>
             <p:ph idx="1" type="body"/>
@@ -21038,7 +21125,7 @@
       </p:sp>
       <p:sp>
         <p:nvSpPr>
-          <p:cNvPr id="150" name="Google Shape;150;p21"/>
+          <p:cNvPr id="152" name="Google Shape;152;p21"/>
           <p:cNvSpPr txBox="1"/>
           <p:nvPr>
             <p:ph idx="12" type="sldNum"/>
@@ -21078,7 +21165,7 @@
       </p:sp>
       <p:grpSp>
         <p:nvGrpSpPr>
-          <p:cNvPr id="151" name="Google Shape;151;p21"/>
+          <p:cNvPr id="153" name="Google Shape;153;p21"/>
           <p:cNvGrpSpPr/>
           <p:nvPr/>
         </p:nvGrpSpPr>
@@ -21092,7 +21179,7 @@
         </p:grpSpPr>
         <p:pic>
           <p:nvPicPr>
-            <p:cNvPr id="152" name="Google Shape;152;p21"/>
+            <p:cNvPr id="154" name="Google Shape;154;p21"/>
             <p:cNvPicPr preferRelativeResize="0"/>
             <p:nvPr/>
           </p:nvPicPr>
@@ -21120,7 +21207,7 @@
         </p:pic>
         <p:pic>
           <p:nvPicPr>
-            <p:cNvPr id="153" name="Google Shape;153;p21"/>
+            <p:cNvPr id="155" name="Google Shape;155;p21"/>
             <p:cNvPicPr preferRelativeResize="0"/>
             <p:nvPr/>
           </p:nvPicPr>
@@ -21148,10 +21235,10 @@
         </p:pic>
         <p:cxnSp>
           <p:nvCxnSpPr>
-            <p:cNvPr id="154" name="Google Shape;154;p21"/>
+            <p:cNvPr id="156" name="Google Shape;156;p21"/>
             <p:cNvCxnSpPr>
-              <a:stCxn id="152" idx="3"/>
-              <a:endCxn id="153" idx="1"/>
+              <a:stCxn id="154" idx="3"/>
+              <a:endCxn id="155" idx="1"/>
             </p:cNvCxnSpPr>
             <p:nvPr/>
           </p:nvCxnSpPr>
@@ -21178,7 +21265,7 @@
       </p:grpSp>
       <p:pic>
         <p:nvPicPr>
-          <p:cNvPr id="155" name="Google Shape;155;p21"/>
+          <p:cNvPr id="157" name="Google Shape;157;p21"/>
           <p:cNvPicPr preferRelativeResize="0"/>
           <p:nvPr/>
         </p:nvPicPr>
@@ -21213,6 +21300,285 @@
 </file>
 
 <file path=ppt/theme/theme1.xml><?xml version="1.0" encoding="utf-8"?>
+<a:theme xmlns:a="http://schemas.openxmlformats.org/drawingml/2006/main" xmlns:r="http://schemas.openxmlformats.org/officeDocument/2006/relationships" name="Slide">
+  <a:themeElements>
+    <a:clrScheme name="Streamline">
+      <a:dk1>
+        <a:srgbClr val="1A9988"/>
+      </a:dk1>
+      <a:lt1>
+        <a:srgbClr val="FFFFFF"/>
+      </a:lt1>
+      <a:dk2>
+        <a:srgbClr val="1A1A1A"/>
+      </a:dk2>
+      <a:lt2>
+        <a:srgbClr val="E9EDEE"/>
+      </a:lt2>
+      <a:accent1>
+        <a:srgbClr val="595959"/>
+      </a:accent1>
+      <a:accent2>
+        <a:srgbClr val="6AA4C8"/>
+      </a:accent2>
+      <a:accent3>
+        <a:srgbClr val="EB5600"/>
+      </a:accent3>
+      <a:accent4>
+        <a:srgbClr val="A2FFE8"/>
+      </a:accent4>
+      <a:accent5>
+        <a:srgbClr val="1C3678"/>
+      </a:accent5>
+      <a:accent6>
+        <a:srgbClr val="FFB8A2"/>
+      </a:accent6>
+      <a:hlink>
+        <a:srgbClr val="1C3678"/>
+      </a:hlink>
+      <a:folHlink>
+        <a:srgbClr val="1C3678"/>
+      </a:folHlink>
+    </a:clrScheme>
+    <a:fontScheme name="Office">
+      <a:majorFont>
+        <a:latin typeface="Arial"/>
+        <a:ea typeface=""/>
+        <a:cs typeface=""/>
+        <a:font script="Jpan" typeface="ＭＳ Ｐゴシック"/>
+        <a:font script="Hang" typeface="맑은 고딕"/>
+        <a:font script="Hans" typeface="宋体"/>
+        <a:font script="Hant" typeface="新細明體"/>
+        <a:font script="Arab" typeface="Times New Roman"/>
+        <a:font script="Hebr" typeface="Times New Roman"/>
+        <a:font script="Thai" typeface="Angsana New"/>
+        <a:font script="Ethi" typeface="Nyala"/>
+        <a:font script="Beng" typeface="Vrinda"/>
+        <a:font script="Gujr" typeface="Shruti"/>
+        <a:font script="Khmr" typeface="MoolBoran"/>
+        <a:font script="Knda" typeface="Tunga"/>
+        <a:font script="Guru" typeface="Raavi"/>
+        <a:font script="Cans" typeface="Euphemia"/>
+        <a:font script="Cher" typeface="Plantagenet Cherokee"/>
+        <a:font script="Yiii" typeface="Microsoft Yi Baiti"/>
+        <a:font script="Tibt" typeface="Microsoft Himalaya"/>
+        <a:font script="Thaa" typeface="MV Boli"/>
+        <a:font script="Deva" typeface="Mangal"/>
+        <a:font script="Telu" typeface="Gautami"/>
+        <a:font script="Taml" typeface="Latha"/>
+        <a:font script="Syrc" typeface="Estrangelo Edessa"/>
+        <a:font script="Orya" typeface="Kalinga"/>
+        <a:font script="Mlym" typeface="Kartika"/>
+        <a:font script="Laoo" typeface="DokChampa"/>
+        <a:font script="Sinh" typeface="Iskoola Pota"/>
+        <a:font script="Mong" typeface="Mongolian Baiti"/>
+        <a:font script="Viet" typeface="Times New Roman"/>
+        <a:font script="Uigh" typeface="Microsoft Uighur"/>
+        <a:font script="Geor" typeface="Sylfaen"/>
+      </a:majorFont>
+      <a:minorFont>
+        <a:latin typeface="Arial"/>
+        <a:ea typeface=""/>
+        <a:cs typeface=""/>
+        <a:font script="Jpan" typeface="ＭＳ Ｐゴシック"/>
+        <a:font script="Hang" typeface="맑은 고딕"/>
+        <a:font script="Hans" typeface="宋体"/>
+        <a:font script="Hant" typeface="新細明體"/>
+        <a:font script="Arab" typeface="Arial"/>
+        <a:font script="Hebr" typeface="Arial"/>
+        <a:font script="Thai" typeface="Cordia New"/>
+        <a:font script="Ethi" typeface="Nyala"/>
+        <a:font script="Beng" typeface="Vrinda"/>
+        <a:font script="Gujr" typeface="Shruti"/>
+        <a:font script="Khmr" typeface="DaunPenh"/>
+        <a:font script="Knda" typeface="Tunga"/>
+        <a:font script="Guru" typeface="Raavi"/>
+        <a:font script="Cans" typeface="Euphemia"/>
+        <a:font script="Cher" typeface="Plantagenet Cherokee"/>
+        <a:font script="Yiii" typeface="Microsoft Yi Baiti"/>
+        <a:font script="Tibt" typeface="Microsoft Himalaya"/>
+        <a:font script="Thaa" typeface="MV Boli"/>
+        <a:font script="Deva" typeface="Mangal"/>
+        <a:font script="Telu" typeface="Gautami"/>
+        <a:font script="Taml" typeface="Latha"/>
+        <a:font script="Syrc" typeface="Estrangelo Edessa"/>
+        <a:font script="Orya" typeface="Kalinga"/>
+        <a:font script="Mlym" typeface="Kartika"/>
+        <a:font script="Laoo" typeface="DokChampa"/>
+        <a:font script="Sinh" typeface="Iskoola Pota"/>
+        <a:font script="Mong" typeface="Mongolian Baiti"/>
+        <a:font script="Viet" typeface="Arial"/>
+        <a:font script="Uigh" typeface="Microsoft Uighur"/>
+        <a:font script="Geor" typeface="Sylfaen"/>
+      </a:minorFont>
+    </a:fontScheme>
+    <a:fmtScheme name="Office">
+      <a:fillStyleLst>
+        <a:solidFill>
+          <a:schemeClr val="phClr"/>
+        </a:solidFill>
+        <a:gradFill rotWithShape="1">
+          <a:gsLst>
+            <a:gs pos="0">
+              <a:schemeClr val="phClr">
+                <a:tint val="50000"/>
+                <a:satMod val="300000"/>
+              </a:schemeClr>
+            </a:gs>
+            <a:gs pos="35000">
+              <a:schemeClr val="phClr">
+                <a:tint val="37000"/>
+                <a:satMod val="300000"/>
+              </a:schemeClr>
+            </a:gs>
+            <a:gs pos="100000">
+              <a:schemeClr val="phClr">
+                <a:tint val="15000"/>
+                <a:satMod val="350000"/>
+              </a:schemeClr>
+            </a:gs>
+          </a:gsLst>
+          <a:lin ang="16200000" scaled="1"/>
+        </a:gradFill>
+        <a:gradFill rotWithShape="1">
+          <a:gsLst>
+            <a:gs pos="0">
+              <a:schemeClr val="phClr">
+                <a:tint val="100000"/>
+                <a:shade val="100000"/>
+                <a:satMod val="130000"/>
+              </a:schemeClr>
+            </a:gs>
+            <a:gs pos="100000">
+              <a:schemeClr val="phClr">
+                <a:tint val="50000"/>
+                <a:shade val="100000"/>
+                <a:satMod val="350000"/>
+              </a:schemeClr>
+            </a:gs>
+          </a:gsLst>
+          <a:lin ang="16200000" scaled="0"/>
+        </a:gradFill>
+      </a:fillStyleLst>
+      <a:lnStyleLst>
+        <a:ln w="9525" cap="flat" cmpd="sng" algn="ctr">
+          <a:solidFill>
+            <a:schemeClr val="phClr">
+              <a:shade val="95000"/>
+              <a:satMod val="105000"/>
+            </a:schemeClr>
+          </a:solidFill>
+          <a:prstDash val="solid"/>
+        </a:ln>
+        <a:ln w="25400" cap="flat" cmpd="sng" algn="ctr">
+          <a:solidFill>
+            <a:schemeClr val="phClr"/>
+          </a:solidFill>
+          <a:prstDash val="solid"/>
+        </a:ln>
+        <a:ln w="38100" cap="flat" cmpd="sng" algn="ctr">
+          <a:solidFill>
+            <a:schemeClr val="phClr"/>
+          </a:solidFill>
+          <a:prstDash val="solid"/>
+        </a:ln>
+      </a:lnStyleLst>
+      <a:effectStyleLst>
+        <a:effectStyle>
+          <a:effectLst>
+            <a:outerShdw blurRad="40000" dist="20000" dir="5400000" rotWithShape="0">
+              <a:srgbClr val="000000">
+                <a:alpha val="38000"/>
+              </a:srgbClr>
+            </a:outerShdw>
+          </a:effectLst>
+        </a:effectStyle>
+        <a:effectStyle>
+          <a:effectLst>
+            <a:outerShdw blurRad="40000" dist="23000" dir="5400000" rotWithShape="0">
+              <a:srgbClr val="000000">
+                <a:alpha val="35000"/>
+              </a:srgbClr>
+            </a:outerShdw>
+          </a:effectLst>
+        </a:effectStyle>
+        <a:effectStyle>
+          <a:effectLst>
+            <a:outerShdw blurRad="40000" dist="23000" dir="5400000" rotWithShape="0">
+              <a:srgbClr val="000000">
+                <a:alpha val="35000"/>
+              </a:srgbClr>
+            </a:outerShdw>
+          </a:effectLst>
+          <a:scene3d>
+            <a:camera prst="orthographicFront">
+              <a:rot lat="0" lon="0" rev="0"/>
+            </a:camera>
+            <a:lightRig rig="threePt" dir="t">
+              <a:rot lat="0" lon="0" rev="1200000"/>
+            </a:lightRig>
+          </a:scene3d>
+          <a:sp3d>
+            <a:bevelT w="63500" h="25400"/>
+          </a:sp3d>
+        </a:effectStyle>
+      </a:effectStyleLst>
+      <a:bgFillStyleLst>
+        <a:solidFill>
+          <a:schemeClr val="phClr"/>
+        </a:solidFill>
+        <a:gradFill rotWithShape="1">
+          <a:gsLst>
+            <a:gs pos="0">
+              <a:schemeClr val="phClr">
+                <a:tint val="40000"/>
+                <a:satMod val="350000"/>
+              </a:schemeClr>
+            </a:gs>
+            <a:gs pos="40000">
+              <a:schemeClr val="phClr">
+                <a:tint val="45000"/>
+                <a:shade val="99000"/>
+                <a:satMod val="350000"/>
+              </a:schemeClr>
+            </a:gs>
+            <a:gs pos="100000">
+              <a:schemeClr val="phClr">
+                <a:shade val="20000"/>
+                <a:satMod val="255000"/>
+              </a:schemeClr>
+            </a:gs>
+          </a:gsLst>
+          <a:path path="circle">
+            <a:fillToRect l="50000" t="-80000" r="50000" b="180000"/>
+          </a:path>
+        </a:gradFill>
+        <a:gradFill rotWithShape="1">
+          <a:gsLst>
+            <a:gs pos="0">
+              <a:schemeClr val="phClr">
+                <a:tint val="80000"/>
+                <a:satMod val="300000"/>
+              </a:schemeClr>
+            </a:gs>
+            <a:gs pos="100000">
+              <a:schemeClr val="phClr">
+                <a:shade val="30000"/>
+                <a:satMod val="200000"/>
+              </a:schemeClr>
+            </a:gs>
+          </a:gsLst>
+          <a:path path="circle">
+            <a:fillToRect l="50000" t="50000" r="50000" b="50000"/>
+          </a:path>
+        </a:gradFill>
+      </a:bgFillStyleLst>
+    </a:fmtScheme>
+  </a:themeElements>
+</a:theme>
+</file>
+
+<file path=ppt/theme/theme2.xml><?xml version="1.0" encoding="utf-8"?>
 <a:theme xmlns:a="http://schemas.openxmlformats.org/drawingml/2006/main" xmlns:r="http://schemas.openxmlformats.org/officeDocument/2006/relationships">
   <a:themeElements>
     <a:clrScheme name="Default">
@@ -21489,283 +21855,4 @@
     </a:fmtScheme>
   </a:themeElements>
 </a:theme>
-</file>
-
-<file path=ppt/theme/theme2.xml><?xml version="1.0" encoding="utf-8"?>
-<a:theme xmlns:a="http://schemas.openxmlformats.org/drawingml/2006/main" xmlns:r="http://schemas.openxmlformats.org/officeDocument/2006/relationships" name="Slide">
-  <a:themeElements>
-    <a:clrScheme name="Streamline">
-      <a:dk1>
-        <a:srgbClr val="1A9988"/>
-      </a:dk1>
-      <a:lt1>
-        <a:srgbClr val="FFFFFF"/>
-      </a:lt1>
-      <a:dk2>
-        <a:srgbClr val="1A1A1A"/>
-      </a:dk2>
-      <a:lt2>
-        <a:srgbClr val="E9EDEE"/>
-      </a:lt2>
-      <a:accent1>
-        <a:srgbClr val="595959"/>
-      </a:accent1>
-      <a:accent2>
-        <a:srgbClr val="6AA4C8"/>
-      </a:accent2>
-      <a:accent3>
-        <a:srgbClr val="EB5600"/>
-      </a:accent3>
-      <a:accent4>
-        <a:srgbClr val="A2FFE8"/>
-      </a:accent4>
-      <a:accent5>
-        <a:srgbClr val="1C3678"/>
-      </a:accent5>
-      <a:accent6>
-        <a:srgbClr val="FFB8A2"/>
-      </a:accent6>
-      <a:hlink>
-        <a:srgbClr val="1C3678"/>
-      </a:hlink>
-      <a:folHlink>
-        <a:srgbClr val="1C3678"/>
-      </a:folHlink>
-    </a:clrScheme>
-    <a:fontScheme name="Office">
-      <a:majorFont>
-        <a:latin typeface="Arial"/>
-        <a:ea typeface=""/>
-        <a:cs typeface=""/>
-        <a:font script="Jpan" typeface="ＭＳ Ｐゴシック"/>
-        <a:font script="Hang" typeface="맑은 고딕"/>
-        <a:font script="Hans" typeface="宋体"/>
-        <a:font script="Hant" typeface="新細明體"/>
-        <a:font script="Arab" typeface="Times New Roman"/>
-        <a:font script="Hebr" typeface="Times New Roman"/>
-        <a:font script="Thai" typeface="Angsana New"/>
-        <a:font script="Ethi" typeface="Nyala"/>
-        <a:font script="Beng" typeface="Vrinda"/>
-        <a:font script="Gujr" typeface="Shruti"/>
-        <a:font script="Khmr" typeface="MoolBoran"/>
-        <a:font script="Knda" typeface="Tunga"/>
-        <a:font script="Guru" typeface="Raavi"/>
-        <a:font script="Cans" typeface="Euphemia"/>
-        <a:font script="Cher" typeface="Plantagenet Cherokee"/>
-        <a:font script="Yiii" typeface="Microsoft Yi Baiti"/>
-        <a:font script="Tibt" typeface="Microsoft Himalaya"/>
-        <a:font script="Thaa" typeface="MV Boli"/>
-        <a:font script="Deva" typeface="Mangal"/>
-        <a:font script="Telu" typeface="Gautami"/>
-        <a:font script="Taml" typeface="Latha"/>
-        <a:font script="Syrc" typeface="Estrangelo Edessa"/>
-        <a:font script="Orya" typeface="Kalinga"/>
-        <a:font script="Mlym" typeface="Kartika"/>
-        <a:font script="Laoo" typeface="DokChampa"/>
-        <a:font script="Sinh" typeface="Iskoola Pota"/>
-        <a:font script="Mong" typeface="Mongolian Baiti"/>
-        <a:font script="Viet" typeface="Times New Roman"/>
-        <a:font script="Uigh" typeface="Microsoft Uighur"/>
-        <a:font script="Geor" typeface="Sylfaen"/>
-      </a:majorFont>
-      <a:minorFont>
-        <a:latin typeface="Arial"/>
-        <a:ea typeface=""/>
-        <a:cs typeface=""/>
-        <a:font script="Jpan" typeface="ＭＳ Ｐゴシック"/>
-        <a:font script="Hang" typeface="맑은 고딕"/>
-        <a:font script="Hans" typeface="宋体"/>
-        <a:font script="Hant" typeface="新細明體"/>
-        <a:font script="Arab" typeface="Arial"/>
-        <a:font script="Hebr" typeface="Arial"/>
-        <a:font script="Thai" typeface="Cordia New"/>
-        <a:font script="Ethi" typeface="Nyala"/>
-        <a:font script="Beng" typeface="Vrinda"/>
-        <a:font script="Gujr" typeface="Shruti"/>
-        <a:font script="Khmr" typeface="DaunPenh"/>
-        <a:font script="Knda" typeface="Tunga"/>
-        <a:font script="Guru" typeface="Raavi"/>
-        <a:font script="Cans" typeface="Euphemia"/>
-        <a:font script="Cher" typeface="Plantagenet Cherokee"/>
-        <a:font script="Yiii" typeface="Microsoft Yi Baiti"/>
-        <a:font script="Tibt" typeface="Microsoft Himalaya"/>
-        <a:font script="Thaa" typeface="MV Boli"/>
-        <a:font script="Deva" typeface="Mangal"/>
-        <a:font script="Telu" typeface="Gautami"/>
-        <a:font script="Taml" typeface="Latha"/>
-        <a:font script="Syrc" typeface="Estrangelo Edessa"/>
-        <a:font script="Orya" typeface="Kalinga"/>
-        <a:font script="Mlym" typeface="Kartika"/>
-        <a:font script="Laoo" typeface="DokChampa"/>
-        <a:font script="Sinh" typeface="Iskoola Pota"/>
-        <a:font script="Mong" typeface="Mongolian Baiti"/>
-        <a:font script="Viet" typeface="Arial"/>
-        <a:font script="Uigh" typeface="Microsoft Uighur"/>
-        <a:font script="Geor" typeface="Sylfaen"/>
-      </a:minorFont>
-    </a:fontScheme>
-    <a:fmtScheme name="Office">
-      <a:fillStyleLst>
-        <a:solidFill>
-          <a:schemeClr val="phClr"/>
-        </a:solidFill>
-        <a:gradFill rotWithShape="1">
-          <a:gsLst>
-            <a:gs pos="0">
-              <a:schemeClr val="phClr">
-                <a:tint val="50000"/>
-                <a:satMod val="300000"/>
-              </a:schemeClr>
-            </a:gs>
-            <a:gs pos="35000">
-              <a:schemeClr val="phClr">
-                <a:tint val="37000"/>
-                <a:satMod val="300000"/>
-              </a:schemeClr>
-            </a:gs>
-            <a:gs pos="100000">
-              <a:schemeClr val="phClr">
-                <a:tint val="15000"/>
-                <a:satMod val="350000"/>
-              </a:schemeClr>
-            </a:gs>
-          </a:gsLst>
-          <a:lin ang="16200000" scaled="1"/>
-        </a:gradFill>
-        <a:gradFill rotWithShape="1">
-          <a:gsLst>
-            <a:gs pos="0">
-              <a:schemeClr val="phClr">
-                <a:tint val="100000"/>
-                <a:shade val="100000"/>
-                <a:satMod val="130000"/>
-              </a:schemeClr>
-            </a:gs>
-            <a:gs pos="100000">
-              <a:schemeClr val="phClr">
-                <a:tint val="50000"/>
-                <a:shade val="100000"/>
-                <a:satMod val="350000"/>
-              </a:schemeClr>
-            </a:gs>
-          </a:gsLst>
-          <a:lin ang="16200000" scaled="0"/>
-        </a:gradFill>
-      </a:fillStyleLst>
-      <a:lnStyleLst>
-        <a:ln w="9525" cap="flat" cmpd="sng" algn="ctr">
-          <a:solidFill>
-            <a:schemeClr val="phClr">
-              <a:shade val="95000"/>
-              <a:satMod val="105000"/>
-            </a:schemeClr>
-          </a:solidFill>
-          <a:prstDash val="solid"/>
-        </a:ln>
-        <a:ln w="25400" cap="flat" cmpd="sng" algn="ctr">
-          <a:solidFill>
-            <a:schemeClr val="phClr"/>
-          </a:solidFill>
-          <a:prstDash val="solid"/>
-        </a:ln>
-        <a:ln w="38100" cap="flat" cmpd="sng" algn="ctr">
-          <a:solidFill>
-            <a:schemeClr val="phClr"/>
-          </a:solidFill>
-          <a:prstDash val="solid"/>
-        </a:ln>
-      </a:lnStyleLst>
-      <a:effectStyleLst>
-        <a:effectStyle>
-          <a:effectLst>
-            <a:outerShdw blurRad="40000" dist="20000" dir="5400000" rotWithShape="0">
-              <a:srgbClr val="000000">
-                <a:alpha val="38000"/>
-              </a:srgbClr>
-            </a:outerShdw>
-          </a:effectLst>
-        </a:effectStyle>
-        <a:effectStyle>
-          <a:effectLst>
-            <a:outerShdw blurRad="40000" dist="23000" dir="5400000" rotWithShape="0">
-              <a:srgbClr val="000000">
-                <a:alpha val="35000"/>
-              </a:srgbClr>
-            </a:outerShdw>
-          </a:effectLst>
-        </a:effectStyle>
-        <a:effectStyle>
-          <a:effectLst>
-            <a:outerShdw blurRad="40000" dist="23000" dir="5400000" rotWithShape="0">
-              <a:srgbClr val="000000">
-                <a:alpha val="35000"/>
-              </a:srgbClr>
-            </a:outerShdw>
-          </a:effectLst>
-          <a:scene3d>
-            <a:camera prst="orthographicFront">
-              <a:rot lat="0" lon="0" rev="0"/>
-            </a:camera>
-            <a:lightRig rig="threePt" dir="t">
-              <a:rot lat="0" lon="0" rev="1200000"/>
-            </a:lightRig>
-          </a:scene3d>
-          <a:sp3d>
-            <a:bevelT w="63500" h="25400"/>
-          </a:sp3d>
-        </a:effectStyle>
-      </a:effectStyleLst>
-      <a:bgFillStyleLst>
-        <a:solidFill>
-          <a:schemeClr val="phClr"/>
-        </a:solidFill>
-        <a:gradFill rotWithShape="1">
-          <a:gsLst>
-            <a:gs pos="0">
-              <a:schemeClr val="phClr">
-                <a:tint val="40000"/>
-                <a:satMod val="350000"/>
-              </a:schemeClr>
-            </a:gs>
-            <a:gs pos="40000">
-              <a:schemeClr val="phClr">
-                <a:tint val="45000"/>
-                <a:shade val="99000"/>
-                <a:satMod val="350000"/>
-              </a:schemeClr>
-            </a:gs>
-            <a:gs pos="100000">
-              <a:schemeClr val="phClr">
-                <a:shade val="20000"/>
-                <a:satMod val="255000"/>
-              </a:schemeClr>
-            </a:gs>
-          </a:gsLst>
-          <a:path path="circle">
-            <a:fillToRect l="50000" t="-80000" r="50000" b="180000"/>
-          </a:path>
-        </a:gradFill>
-        <a:gradFill rotWithShape="1">
-          <a:gsLst>
-            <a:gs pos="0">
-              <a:schemeClr val="phClr">
-                <a:tint val="80000"/>
-                <a:satMod val="300000"/>
-              </a:schemeClr>
-            </a:gs>
-            <a:gs pos="100000">
-              <a:schemeClr val="phClr">
-                <a:shade val="30000"/>
-                <a:satMod val="200000"/>
-              </a:schemeClr>
-            </a:gs>
-          </a:gsLst>
-          <a:path path="circle">
-            <a:fillToRect l="50000" t="50000" r="50000" b="50000"/>
-          </a:path>
-        </a:gradFill>
-      </a:bgFillStyleLst>
-    </a:fmtScheme>
-  </a:themeElements>
-</a:theme>
 </file>
</xml_diff>